<commit_message>
Adjusted LLAMA company pic
Adjusted the LLAMA company pic and added a slide to add a short company intro.
</commit_message>
<xml_diff>
--- a/LLAMA Inc.pptx
+++ b/LLAMA Inc.pptx
@@ -5,26 +5,27 @@
     <p:sldMasterId id="2147483744" r:id="rId4"/>
   </p:sldMasterIdLst>
   <p:notesMasterIdLst>
-    <p:notesMasterId r:id="rId19"/>
+    <p:notesMasterId r:id="rId20"/>
   </p:notesMasterIdLst>
   <p:handoutMasterIdLst>
-    <p:handoutMasterId r:id="rId20"/>
+    <p:handoutMasterId r:id="rId21"/>
   </p:handoutMasterIdLst>
   <p:sldIdLst>
     <p:sldId id="355" r:id="rId5"/>
-    <p:sldId id="372" r:id="rId6"/>
-    <p:sldId id="367" r:id="rId7"/>
-    <p:sldId id="378" r:id="rId8"/>
-    <p:sldId id="369" r:id="rId9"/>
-    <p:sldId id="343" r:id="rId10"/>
-    <p:sldId id="373" r:id="rId11"/>
-    <p:sldId id="374" r:id="rId12"/>
-    <p:sldId id="345" r:id="rId13"/>
-    <p:sldId id="375" r:id="rId14"/>
-    <p:sldId id="368" r:id="rId15"/>
-    <p:sldId id="376" r:id="rId16"/>
-    <p:sldId id="341" r:id="rId17"/>
-    <p:sldId id="377" r:id="rId18"/>
+    <p:sldId id="379" r:id="rId6"/>
+    <p:sldId id="372" r:id="rId7"/>
+    <p:sldId id="367" r:id="rId8"/>
+    <p:sldId id="378" r:id="rId9"/>
+    <p:sldId id="369" r:id="rId10"/>
+    <p:sldId id="343" r:id="rId11"/>
+    <p:sldId id="373" r:id="rId12"/>
+    <p:sldId id="374" r:id="rId13"/>
+    <p:sldId id="345" r:id="rId14"/>
+    <p:sldId id="375" r:id="rId15"/>
+    <p:sldId id="368" r:id="rId16"/>
+    <p:sldId id="376" r:id="rId17"/>
+    <p:sldId id="341" r:id="rId18"/>
+    <p:sldId id="377" r:id="rId19"/>
   </p:sldIdLst>
   <p:sldSz cx="12192000" cy="6858000"/>
   <p:notesSz cx="6858000" cy="9144000"/>
@@ -9070,7 +9071,7 @@
           <a:p>
             <a:fld id="{F250A84D-7040-4B66-A8F2-FF3252F0E77C}" type="datetimeFigureOut">
               <a:rPr lang="en-US" smtClean="0"/>
-              <a:t>1/25/2024</a:t>
+              <a:t>1/26/2024</a:t>
             </a:fld>
             <a:endParaRPr lang="en-US" dirty="0"/>
           </a:p>
@@ -9247,7 +9248,7 @@
           <a:p>
             <a:fld id="{47252D08-8B84-4A6F-9F01-611184AC5843}" type="datetimeFigureOut">
               <a:rPr lang="en-US" smtClean="0"/>
-              <a:t>1/25/2024</a:t>
+              <a:t>1/26/2024</a:t>
             </a:fld>
             <a:endParaRPr lang="en-US" dirty="0"/>
           </a:p>
@@ -9680,7 +9681,7 @@
           <a:p>
             <a:fld id="{41624F0E-DEC4-4055-BBC2-60E713F4A980}" type="slidenum">
               <a:rPr lang="en-US" smtClean="0"/>
-              <a:t>13</a:t>
+              <a:t>12</a:t>
             </a:fld>
             <a:endParaRPr lang="en-US" dirty="0"/>
           </a:p>
@@ -9689,7 +9690,7 @@
     </p:spTree>
     <p:extLst>
       <p:ext uri="{BB962C8B-B14F-4D97-AF65-F5344CB8AC3E}">
-        <p14:creationId xmlns:p14="http://schemas.microsoft.com/office/powerpoint/2010/main" val="3470242079"/>
+        <p14:creationId xmlns:p14="http://schemas.microsoft.com/office/powerpoint/2010/main" val="1074466376"/>
       </p:ext>
     </p:extLst>
   </p:cSld>
@@ -9779,9 +9780,110 @@
           <a:bodyPr/>
           <a:lstStyle/>
           <a:p>
+            <a:fld id="{41624F0E-DEC4-4055-BBC2-60E713F4A980}" type="slidenum">
+              <a:rPr lang="en-US" smtClean="0"/>
+              <a:t>14</a:t>
+            </a:fld>
+            <a:endParaRPr lang="en-US" dirty="0"/>
+          </a:p>
+        </p:txBody>
+      </p:sp>
+    </p:spTree>
+    <p:extLst>
+      <p:ext uri="{BB962C8B-B14F-4D97-AF65-F5344CB8AC3E}">
+        <p14:creationId xmlns:p14="http://schemas.microsoft.com/office/powerpoint/2010/main" val="3470242079"/>
+      </p:ext>
+    </p:extLst>
+  </p:cSld>
+  <p:clrMapOvr>
+    <a:masterClrMapping/>
+  </p:clrMapOvr>
+</p:notes>
+</file>
+
+<file path=ppt/notesSlides/notesSlide12.xml><?xml version="1.0" encoding="utf-8"?>
+<p:notes xmlns:a="http://schemas.openxmlformats.org/drawingml/2006/main" xmlns:r="http://schemas.openxmlformats.org/officeDocument/2006/relationships" xmlns:p="http://schemas.openxmlformats.org/presentationml/2006/main">
+  <p:cSld>
+    <p:spTree>
+      <p:nvGrpSpPr>
+        <p:cNvPr id="1" name=""/>
+        <p:cNvGrpSpPr/>
+        <p:nvPr/>
+      </p:nvGrpSpPr>
+      <p:grpSpPr>
+        <a:xfrm>
+          <a:off x="0" y="0"/>
+          <a:ext cx="0" cy="0"/>
+          <a:chOff x="0" y="0"/>
+          <a:chExt cx="0" cy="0"/>
+        </a:xfrm>
+      </p:grpSpPr>
+      <p:sp>
+        <p:nvSpPr>
+          <p:cNvPr id="2" name="Slide Image Placeholder 1"/>
+          <p:cNvSpPr>
+            <a:spLocks noGrp="1" noRot="1" noChangeAspect="1"/>
+          </p:cNvSpPr>
+          <p:nvPr>
+            <p:ph type="sldImg"/>
+          </p:nvPr>
+        </p:nvSpPr>
+        <p:spPr/>
+      </p:sp>
+      <p:sp>
+        <p:nvSpPr>
+          <p:cNvPr id="3" name="Notes Placeholder 2"/>
+          <p:cNvSpPr>
+            <a:spLocks noGrp="1"/>
+          </p:cNvSpPr>
+          <p:nvPr>
+            <p:ph type="body" idx="1"/>
+          </p:nvPr>
+        </p:nvSpPr>
+        <p:spPr/>
+        <p:txBody>
+          <a:bodyPr/>
+          <a:lstStyle/>
+          <a:p>
+            <a:pPr marL="0" marR="0" lvl="0" indent="0" algn="l" defTabSz="914400" rtl="0" eaLnBrk="1" fontAlgn="auto" latinLnBrk="0" hangingPunct="1">
+              <a:lnSpc>
+                <a:spcPct val="100000"/>
+              </a:lnSpc>
+              <a:spcBef>
+                <a:spcPts val="0"/>
+              </a:spcBef>
+              <a:spcAft>
+                <a:spcPts val="0"/>
+              </a:spcAft>
+              <a:buClrTx/>
+              <a:buSzTx/>
+              <a:buFontTx/>
+              <a:buNone/>
+              <a:tabLst/>
+              <a:defRPr/>
+            </a:pPr>
+            <a:endParaRPr lang="en-US" dirty="0"/>
+          </a:p>
+        </p:txBody>
+      </p:sp>
+      <p:sp>
+        <p:nvSpPr>
+          <p:cNvPr id="4" name="Slide Number Placeholder 3"/>
+          <p:cNvSpPr>
+            <a:spLocks noGrp="1"/>
+          </p:cNvSpPr>
+          <p:nvPr>
+            <p:ph type="sldNum" sz="quarter" idx="5"/>
+          </p:nvPr>
+        </p:nvSpPr>
+        <p:spPr/>
+        <p:txBody>
+          <a:bodyPr/>
+          <a:lstStyle/>
+          <a:p>
             <a:fld id="{EDA29696-2BE8-442F-AE32-06B5202A784A}" type="slidenum">
               <a:rPr lang="en-US" smtClean="0"/>
-              <a:t>14</a:t>
+              <a:t>15</a:t>
             </a:fld>
             <a:endParaRPr lang="en-US" dirty="0"/>
           </a:p>
@@ -9891,7 +9993,7 @@
     </p:spTree>
     <p:extLst>
       <p:ext uri="{BB962C8B-B14F-4D97-AF65-F5344CB8AC3E}">
-        <p14:creationId xmlns:p14="http://schemas.microsoft.com/office/powerpoint/2010/main" val="1664122704"/>
+        <p14:creationId xmlns:p14="http://schemas.microsoft.com/office/powerpoint/2010/main" val="1920235456"/>
       </p:ext>
     </p:extLst>
   </p:cSld>
@@ -9992,7 +10094,7 @@
     </p:spTree>
     <p:extLst>
       <p:ext uri="{BB962C8B-B14F-4D97-AF65-F5344CB8AC3E}">
-        <p14:creationId xmlns:p14="http://schemas.microsoft.com/office/powerpoint/2010/main" val="3470242079"/>
+        <p14:creationId xmlns:p14="http://schemas.microsoft.com/office/powerpoint/2010/main" val="1664122704"/>
       </p:ext>
     </p:extLst>
   </p:cSld>
@@ -10093,7 +10195,7 @@
     </p:spTree>
     <p:extLst>
       <p:ext uri="{BB962C8B-B14F-4D97-AF65-F5344CB8AC3E}">
-        <p14:creationId xmlns:p14="http://schemas.microsoft.com/office/powerpoint/2010/main" val="4073670322"/>
+        <p14:creationId xmlns:p14="http://schemas.microsoft.com/office/powerpoint/2010/main" val="3470242079"/>
       </p:ext>
     </p:extLst>
   </p:cSld>
@@ -10183,7 +10285,7 @@
           <a:bodyPr/>
           <a:lstStyle/>
           <a:p>
-            <a:fld id="{EDA29696-2BE8-442F-AE32-06B5202A784A}" type="slidenum">
+            <a:fld id="{41624F0E-DEC4-4055-BBC2-60E713F4A980}" type="slidenum">
               <a:rPr lang="en-US" smtClean="0"/>
               <a:t>5</a:t>
             </a:fld>
@@ -10194,7 +10296,7 @@
     </p:spTree>
     <p:extLst>
       <p:ext uri="{BB962C8B-B14F-4D97-AF65-F5344CB8AC3E}">
-        <p14:creationId xmlns:p14="http://schemas.microsoft.com/office/powerpoint/2010/main" val="977106495"/>
+        <p14:creationId xmlns:p14="http://schemas.microsoft.com/office/powerpoint/2010/main" val="4073670322"/>
       </p:ext>
     </p:extLst>
   </p:cSld>
@@ -10284,7 +10386,7 @@
           <a:bodyPr/>
           <a:lstStyle/>
           <a:p>
-            <a:fld id="{41624F0E-DEC4-4055-BBC2-60E713F4A980}" type="slidenum">
+            <a:fld id="{EDA29696-2BE8-442F-AE32-06B5202A784A}" type="slidenum">
               <a:rPr lang="en-US" smtClean="0"/>
               <a:t>6</a:t>
             </a:fld>
@@ -10295,7 +10397,7 @@
     </p:spTree>
     <p:extLst>
       <p:ext uri="{BB962C8B-B14F-4D97-AF65-F5344CB8AC3E}">
-        <p14:creationId xmlns:p14="http://schemas.microsoft.com/office/powerpoint/2010/main" val="3470242079"/>
+        <p14:creationId xmlns:p14="http://schemas.microsoft.com/office/powerpoint/2010/main" val="977106495"/>
       </p:ext>
     </p:extLst>
   </p:cSld>
@@ -10385,9 +10487,9 @@
           <a:bodyPr/>
           <a:lstStyle/>
           <a:p>
-            <a:fld id="{EDA29696-2BE8-442F-AE32-06B5202A784A}" type="slidenum">
+            <a:fld id="{41624F0E-DEC4-4055-BBC2-60E713F4A980}" type="slidenum">
               <a:rPr lang="en-US" smtClean="0"/>
-              <a:t>8</a:t>
+              <a:t>7</a:t>
             </a:fld>
             <a:endParaRPr lang="en-US" dirty="0"/>
           </a:p>
@@ -10396,7 +10498,7 @@
     </p:spTree>
     <p:extLst>
       <p:ext uri="{BB962C8B-B14F-4D97-AF65-F5344CB8AC3E}">
-        <p14:creationId xmlns:p14="http://schemas.microsoft.com/office/powerpoint/2010/main" val="2581206138"/>
+        <p14:creationId xmlns:p14="http://schemas.microsoft.com/office/powerpoint/2010/main" val="3470242079"/>
       </p:ext>
     </p:extLst>
   </p:cSld>
@@ -10486,7 +10588,7 @@
           <a:bodyPr/>
           <a:lstStyle/>
           <a:p>
-            <a:fld id="{41624F0E-DEC4-4055-BBC2-60E713F4A980}" type="slidenum">
+            <a:fld id="{EDA29696-2BE8-442F-AE32-06B5202A784A}" type="slidenum">
               <a:rPr lang="en-US" smtClean="0"/>
               <a:t>9</a:t>
             </a:fld>
@@ -10497,7 +10599,7 @@
     </p:spTree>
     <p:extLst>
       <p:ext uri="{BB962C8B-B14F-4D97-AF65-F5344CB8AC3E}">
-        <p14:creationId xmlns:p14="http://schemas.microsoft.com/office/powerpoint/2010/main" val="3470242079"/>
+        <p14:creationId xmlns:p14="http://schemas.microsoft.com/office/powerpoint/2010/main" val="2581206138"/>
       </p:ext>
     </p:extLst>
   </p:cSld>
@@ -10589,7 +10691,7 @@
           <a:p>
             <a:fld id="{41624F0E-DEC4-4055-BBC2-60E713F4A980}" type="slidenum">
               <a:rPr lang="en-US" smtClean="0"/>
-              <a:t>11</a:t>
+              <a:t>10</a:t>
             </a:fld>
             <a:endParaRPr lang="en-US" dirty="0"/>
           </a:p>
@@ -10598,7 +10700,7 @@
     </p:spTree>
     <p:extLst>
       <p:ext uri="{BB962C8B-B14F-4D97-AF65-F5344CB8AC3E}">
-        <p14:creationId xmlns:p14="http://schemas.microsoft.com/office/powerpoint/2010/main" val="1074466376"/>
+        <p14:creationId xmlns:p14="http://schemas.microsoft.com/office/powerpoint/2010/main" val="3470242079"/>
       </p:ext>
     </p:extLst>
   </p:cSld>
@@ -21996,7 +22098,7 @@
           <a:lstStyle/>
           <a:p>
             <a:r>
-              <a:rPr lang="en-US" sz="4200" kern="1200">
+              <a:rPr lang="en-US" sz="4200" kern="1200" dirty="0">
                 <a:solidFill>
                   <a:schemeClr val="tx1"/>
                 </a:solidFill>
@@ -22007,7 +22109,7 @@
               <a:t>L.L.A.M.A. Inc.</a:t>
             </a:r>
             <a:br>
-              <a:rPr lang="en-US" sz="4200" kern="1200">
+              <a:rPr lang="en-US" sz="4200" kern="1200" dirty="0">
                 <a:solidFill>
                   <a:schemeClr val="tx1"/>
                 </a:solidFill>
@@ -22017,7 +22119,7 @@
               </a:rPr>
             </a:br>
             <a:r>
-              <a:rPr lang="en-US" sz="4200" kern="1200">
+              <a:rPr lang="en-US" sz="4200" kern="1200" dirty="0">
                 <a:solidFill>
                   <a:schemeClr val="tx1"/>
                 </a:solidFill>
@@ -22068,31 +22170,28 @@
             </a:r>
           </a:p>
           <a:p>
-            <a:r>
-              <a:rPr lang="en-US" sz="2200" kern="1200" dirty="0">
-                <a:solidFill>
-                  <a:schemeClr val="tx1"/>
-                </a:solidFill>
-                <a:latin typeface="+mn-lt"/>
-                <a:ea typeface="+mn-ea"/>
-                <a:cs typeface="+mn-cs"/>
-              </a:rPr>
-              <a:t>(Fiancé is working on fixing the wording in the logo)</a:t>
-            </a:r>
+            <a:endParaRPr lang="en-US" sz="2200" kern="1200" dirty="0">
+              <a:solidFill>
+                <a:schemeClr val="tx1"/>
+              </a:solidFill>
+              <a:latin typeface="+mn-lt"/>
+              <a:ea typeface="+mn-ea"/>
+              <a:cs typeface="+mn-cs"/>
+            </a:endParaRPr>
           </a:p>
         </p:txBody>
       </p:sp>
       <p:pic>
         <p:nvPicPr>
-          <p:cNvPr id="19" name="Picture Placeholder 18" descr="A logo with a bird and city in the background&#10;&#10;Description automatically generated">
+          <p:cNvPr id="19" name="Picture Placeholder 18">
             <a:extLst>
               <a:ext uri="{FF2B5EF4-FFF2-40B4-BE49-F238E27FC236}">
                 <a16:creationId xmlns:a16="http://schemas.microsoft.com/office/drawing/2014/main" id="{39881573-7C25-4F17-A03E-E8E1E0E88603}"/>
               </a:ext>
             </a:extLst>
           </p:cNvPr>
-          <p:cNvPicPr>
-            <a:picLocks noGrp="1" noChangeAspect="1"/>
+          <p:cNvPicPr preferRelativeResize="0">
+            <a:picLocks noGrp="1"/>
           </p:cNvPicPr>
           <p:nvPr>
             <p:ph type="pic" sz="quarter" idx="13"/>
@@ -22100,13 +22199,13 @@
         </p:nvPicPr>
         <p:blipFill>
           <a:blip r:embed="rId3"/>
-          <a:srcRect l="2650" r="2650"/>
+          <a:srcRect t="182" b="182"/>
           <a:stretch/>
         </p:blipFill>
         <p:spPr>
           <a:xfrm>
-            <a:off x="5575358" y="575425"/>
-            <a:ext cx="5444468" cy="5749175"/>
+            <a:off x="4761473" y="304800"/>
+            <a:ext cx="7025932" cy="6407624"/>
           </a:xfrm>
           <a:prstGeom prst="rect">
             <a:avLst/>
@@ -22184,6 +22283,202 @@
 </file>
 
 <file path=ppt/slides/slide10.xml><?xml version="1.0" encoding="utf-8"?>
+<p:sld xmlns:a="http://schemas.openxmlformats.org/drawingml/2006/main" xmlns:r="http://schemas.openxmlformats.org/officeDocument/2006/relationships" xmlns:p="http://schemas.openxmlformats.org/presentationml/2006/main">
+  <p:cSld>
+    <p:spTree>
+      <p:nvGrpSpPr>
+        <p:cNvPr id="1" name=""/>
+        <p:cNvGrpSpPr/>
+        <p:nvPr/>
+      </p:nvGrpSpPr>
+      <p:grpSpPr>
+        <a:xfrm>
+          <a:off x="0" y="0"/>
+          <a:ext cx="0" cy="0"/>
+          <a:chOff x="0" y="0"/>
+          <a:chExt cx="0" cy="0"/>
+        </a:xfrm>
+      </p:grpSpPr>
+      <p:sp>
+        <p:nvSpPr>
+          <p:cNvPr id="14" name="Title 13">
+            <a:extLst>
+              <a:ext uri="{FF2B5EF4-FFF2-40B4-BE49-F238E27FC236}">
+                <a16:creationId xmlns:a16="http://schemas.microsoft.com/office/drawing/2014/main" id="{9388704E-D67C-4378-8FA9-A83871F51038}"/>
+              </a:ext>
+            </a:extLst>
+          </p:cNvPr>
+          <p:cNvSpPr>
+            <a:spLocks noGrp="1"/>
+          </p:cNvSpPr>
+          <p:nvPr>
+            <p:ph type="title"/>
+          </p:nvPr>
+        </p:nvSpPr>
+        <p:spPr>
+          <a:xfrm>
+            <a:off x="457200" y="544786"/>
+            <a:ext cx="11238346" cy="836339"/>
+          </a:xfrm>
+        </p:spPr>
+        <p:txBody>
+          <a:bodyPr/>
+          <a:lstStyle/>
+          <a:p>
+            <a:r>
+              <a:rPr lang="en-US" dirty="0"/>
+              <a:t>Team</a:t>
+            </a:r>
+          </a:p>
+        </p:txBody>
+      </p:sp>
+      <p:sp>
+        <p:nvSpPr>
+          <p:cNvPr id="15" name="Date Placeholder 14">
+            <a:extLst>
+              <a:ext uri="{FF2B5EF4-FFF2-40B4-BE49-F238E27FC236}">
+                <a16:creationId xmlns:a16="http://schemas.microsoft.com/office/drawing/2014/main" id="{B83F0619-16A4-44CD-BC6C-D8788D7869AF}"/>
+              </a:ext>
+            </a:extLst>
+          </p:cNvPr>
+          <p:cNvSpPr>
+            <a:spLocks noGrp="1"/>
+          </p:cNvSpPr>
+          <p:nvPr>
+            <p:ph type="dt" sz="half" idx="10"/>
+          </p:nvPr>
+        </p:nvSpPr>
+        <p:spPr>
+          <a:xfrm>
+            <a:off x="838200" y="6400800"/>
+            <a:ext cx="2743200" cy="365125"/>
+          </a:xfrm>
+        </p:spPr>
+        <p:txBody>
+          <a:bodyPr/>
+          <a:lstStyle/>
+          <a:p>
+            <a:r>
+              <a:rPr lang="en-US"/>
+              <a:t>2/2/20XX</a:t>
+            </a:r>
+            <a:endParaRPr lang="en-US" dirty="0"/>
+          </a:p>
+        </p:txBody>
+      </p:sp>
+      <p:sp>
+        <p:nvSpPr>
+          <p:cNvPr id="16" name="Footer Placeholder 15">
+            <a:extLst>
+              <a:ext uri="{FF2B5EF4-FFF2-40B4-BE49-F238E27FC236}">
+                <a16:creationId xmlns:a16="http://schemas.microsoft.com/office/drawing/2014/main" id="{365C13F4-B6C5-4ABF-B9CF-27AE8394981F}"/>
+              </a:ext>
+            </a:extLst>
+          </p:cNvPr>
+          <p:cNvSpPr>
+            <a:spLocks noGrp="1"/>
+          </p:cNvSpPr>
+          <p:nvPr>
+            <p:ph type="ftr" sz="quarter" idx="11"/>
+          </p:nvPr>
+        </p:nvSpPr>
+        <p:spPr>
+          <a:xfrm>
+            <a:off x="4038600" y="6400800"/>
+            <a:ext cx="4114800" cy="365125"/>
+          </a:xfrm>
+        </p:spPr>
+        <p:txBody>
+          <a:bodyPr/>
+          <a:lstStyle/>
+          <a:p>
+            <a:r>
+              <a:rPr lang="en-US" dirty="0"/>
+              <a:t>PRESENTATION TITLE</a:t>
+            </a:r>
+          </a:p>
+        </p:txBody>
+      </p:sp>
+      <p:sp>
+        <p:nvSpPr>
+          <p:cNvPr id="17" name="Slide Number Placeholder 16">
+            <a:extLst>
+              <a:ext uri="{FF2B5EF4-FFF2-40B4-BE49-F238E27FC236}">
+                <a16:creationId xmlns:a16="http://schemas.microsoft.com/office/drawing/2014/main" id="{158AAB3C-64BD-4A61-9806-A8BF13DDA6D6}"/>
+              </a:ext>
+            </a:extLst>
+          </p:cNvPr>
+          <p:cNvSpPr>
+            <a:spLocks noGrp="1"/>
+          </p:cNvSpPr>
+          <p:nvPr>
+            <p:ph type="sldNum" sz="quarter" idx="12"/>
+          </p:nvPr>
+        </p:nvSpPr>
+        <p:spPr>
+          <a:xfrm>
+            <a:off x="8610600" y="6400800"/>
+            <a:ext cx="2743200" cy="365125"/>
+          </a:xfrm>
+        </p:spPr>
+        <p:txBody>
+          <a:bodyPr/>
+          <a:lstStyle/>
+          <a:p>
+            <a:fld id="{DFA5D71E-5CDF-4C93-8A75-5B916FDC5BEA}" type="slidenum">
+              <a:rPr lang="en-US" smtClean="0"/>
+              <a:pPr/>
+              <a:t>10</a:t>
+            </a:fld>
+            <a:endParaRPr lang="en-US" dirty="0"/>
+          </a:p>
+        </p:txBody>
+      </p:sp>
+      <p:graphicFrame>
+        <p:nvGraphicFramePr>
+          <p:cNvPr id="19" name="Content Placeholder 2" descr="Team Placeholder ">
+            <a:extLst>
+              <a:ext uri="{FF2B5EF4-FFF2-40B4-BE49-F238E27FC236}">
+                <a16:creationId xmlns:a16="http://schemas.microsoft.com/office/drawing/2014/main" id="{3EAC8B30-4F38-409D-B2C5-1D1A1DD71808}"/>
+              </a:ext>
+            </a:extLst>
+          </p:cNvPr>
+          <p:cNvGraphicFramePr>
+            <a:graphicFrameLocks noGrp="1"/>
+          </p:cNvGraphicFramePr>
+          <p:nvPr>
+            <p:ph sz="quarter" idx="13"/>
+            <p:extLst>
+              <p:ext uri="{D42A27DB-BD31-4B8C-83A1-F6EECF244321}">
+                <p14:modId xmlns:p14="http://schemas.microsoft.com/office/powerpoint/2010/main" val="1858787959"/>
+              </p:ext>
+            </p:extLst>
+          </p:nvPr>
+        </p:nvGraphicFramePr>
+        <p:xfrm>
+          <a:off x="390525" y="1962150"/>
+          <a:ext cx="11407775" cy="4351338"/>
+        </p:xfrm>
+        <a:graphic>
+          <a:graphicData uri="http://schemas.openxmlformats.org/drawingml/2006/diagram">
+            <dgm:relIds xmlns:dgm="http://schemas.openxmlformats.org/drawingml/2006/diagram" xmlns:r="http://schemas.openxmlformats.org/officeDocument/2006/relationships" r:dm="rId3" r:lo="rId4" r:qs="rId5" r:cs="rId6"/>
+          </a:graphicData>
+        </a:graphic>
+      </p:graphicFrame>
+    </p:spTree>
+    <p:extLst>
+      <p:ext uri="{BB962C8B-B14F-4D97-AF65-F5344CB8AC3E}">
+        <p14:creationId xmlns:p14="http://schemas.microsoft.com/office/powerpoint/2010/main" val="4155872974"/>
+      </p:ext>
+    </p:extLst>
+  </p:cSld>
+  <p:clrMapOvr>
+    <a:masterClrMapping/>
+  </p:clrMapOvr>
+</p:sld>
+</file>
+
+<file path=ppt/slides/slide11.xml><?xml version="1.0" encoding="utf-8"?>
 <p:sld xmlns:a="http://schemas.openxmlformats.org/drawingml/2006/main" xmlns:r="http://schemas.openxmlformats.org/officeDocument/2006/relationships" xmlns:p="http://schemas.openxmlformats.org/presentationml/2006/main">
   <p:cSld>
     <p:spTree>
@@ -22329,7 +22624,7 @@
             <a:fld id="{DFA5D71E-5CDF-4C93-8A75-5B916FDC5BEA}" type="slidenum">
               <a:rPr lang="en-US" smtClean="0"/>
               <a:pPr/>
-              <a:t>10</a:t>
+              <a:t>11</a:t>
             </a:fld>
             <a:endParaRPr lang="en-US" dirty="0"/>
           </a:p>
@@ -22379,7 +22674,7 @@
 </p:sld>
 </file>
 
-<file path=ppt/slides/slide11.xml><?xml version="1.0" encoding="utf-8"?>
+<file path=ppt/slides/slide12.xml><?xml version="1.0" encoding="utf-8"?>
 <p:sld xmlns:a="http://schemas.openxmlformats.org/drawingml/2006/main" xmlns:r="http://schemas.openxmlformats.org/officeDocument/2006/relationships" xmlns:p="http://schemas.openxmlformats.org/presentationml/2006/main">
   <p:cSld>
     <p:spTree>
@@ -22678,7 +22973,7 @@
             <a:fld id="{DFA5D71E-5CDF-4C93-8A75-5B916FDC5BEA}" type="slidenum">
               <a:rPr lang="en-US" smtClean="0"/>
               <a:pPr/>
-              <a:t>11</a:t>
+              <a:t>12</a:t>
             </a:fld>
             <a:endParaRPr lang="en-US" dirty="0"/>
           </a:p>
@@ -22697,7 +22992,7 @@
 </p:sld>
 </file>
 
-<file path=ppt/slides/slide12.xml><?xml version="1.0" encoding="utf-8"?>
+<file path=ppt/slides/slide13.xml><?xml version="1.0" encoding="utf-8"?>
 <p:sld xmlns:a="http://schemas.openxmlformats.org/drawingml/2006/main" xmlns:r="http://schemas.openxmlformats.org/officeDocument/2006/relationships" xmlns:p="http://schemas.openxmlformats.org/presentationml/2006/main">
   <p:cSld>
     <p:spTree>
@@ -23065,7 +23360,7 @@
             <a:fld id="{DFA5D71E-5CDF-4C93-8A75-5B916FDC5BEA}" type="slidenum">
               <a:rPr lang="en-US" smtClean="0"/>
               <a:pPr/>
-              <a:t>12</a:t>
+              <a:t>13</a:t>
             </a:fld>
             <a:endParaRPr lang="en-US" dirty="0"/>
           </a:p>
@@ -23084,7 +23379,7 @@
 </p:sld>
 </file>
 
-<file path=ppt/slides/slide13.xml><?xml version="1.0" encoding="utf-8"?>
+<file path=ppt/slides/slide14.xml><?xml version="1.0" encoding="utf-8"?>
 <p:sld xmlns:a="http://schemas.openxmlformats.org/drawingml/2006/main" xmlns:r="http://schemas.openxmlformats.org/officeDocument/2006/relationships" xmlns:p="http://schemas.openxmlformats.org/presentationml/2006/main">
   <p:cSld>
     <p:spTree>
@@ -23359,7 +23654,7 @@
             <a:fld id="{DFA5D71E-5CDF-4C93-8A75-5B916FDC5BEA}" type="slidenum">
               <a:rPr lang="en-US" smtClean="0"/>
               <a:pPr/>
-              <a:t>13</a:t>
+              <a:t>14</a:t>
             </a:fld>
             <a:endParaRPr lang="en-US" dirty="0"/>
           </a:p>
@@ -23434,7 +23729,7 @@
 </p:sld>
 </file>
 
-<file path=ppt/slides/slide14.xml><?xml version="1.0" encoding="utf-8"?>
+<file path=ppt/slides/slide15.xml><?xml version="1.0" encoding="utf-8"?>
 <p:sld xmlns:a="http://schemas.openxmlformats.org/drawingml/2006/main" xmlns:r="http://schemas.openxmlformats.org/officeDocument/2006/relationships" xmlns:p="http://schemas.openxmlformats.org/presentationml/2006/main">
   <p:cSld>
     <p:spTree>
@@ -23548,7 +23843,7 @@
             <a:fld id="{DFA5D71E-5CDF-4C93-8A75-5B916FDC5BEA}" type="slidenum">
               <a:rPr lang="en-US" smtClean="0"/>
               <a:pPr/>
-              <a:t>14</a:t>
+              <a:t>15</a:t>
             </a:fld>
             <a:endParaRPr lang="en-US" dirty="0"/>
           </a:p>
@@ -23568,6 +23863,219 @@
 </file>
 
 <file path=ppt/slides/slide2.xml><?xml version="1.0" encoding="utf-8"?>
+<p:sld xmlns:a="http://schemas.openxmlformats.org/drawingml/2006/main" xmlns:r="http://schemas.openxmlformats.org/officeDocument/2006/relationships" xmlns:p="http://schemas.openxmlformats.org/presentationml/2006/main">
+  <p:cSld>
+    <p:spTree>
+      <p:nvGrpSpPr>
+        <p:cNvPr id="1" name=""/>
+        <p:cNvGrpSpPr/>
+        <p:nvPr/>
+      </p:nvGrpSpPr>
+      <p:grpSpPr>
+        <a:xfrm>
+          <a:off x="0" y="0"/>
+          <a:ext cx="0" cy="0"/>
+          <a:chOff x="0" y="0"/>
+          <a:chExt cx="0" cy="0"/>
+        </a:xfrm>
+      </p:grpSpPr>
+      <p:sp>
+        <p:nvSpPr>
+          <p:cNvPr id="9" name="Title 8">
+            <a:extLst>
+              <a:ext uri="{FF2B5EF4-FFF2-40B4-BE49-F238E27FC236}">
+                <a16:creationId xmlns:a16="http://schemas.microsoft.com/office/drawing/2014/main" id="{DBF00274-58B0-4B5F-A440-AEB4BC1DE48B}"/>
+              </a:ext>
+            </a:extLst>
+          </p:cNvPr>
+          <p:cNvSpPr>
+            <a:spLocks noGrp="1"/>
+          </p:cNvSpPr>
+          <p:nvPr>
+            <p:ph type="title"/>
+          </p:nvPr>
+        </p:nvSpPr>
+        <p:spPr>
+          <a:xfrm>
+            <a:off x="208067" y="566490"/>
+            <a:ext cx="11691690" cy="1502704"/>
+          </a:xfrm>
+        </p:spPr>
+        <p:txBody>
+          <a:bodyPr>
+            <a:normAutofit/>
+          </a:bodyPr>
+          <a:lstStyle/>
+          <a:p>
+            <a:r>
+              <a:rPr lang="en-US" sz="4000" dirty="0"/>
+              <a:t>L.L.A.M.A (Libraries, Life, and Medical Assistance)</a:t>
+            </a:r>
+          </a:p>
+        </p:txBody>
+      </p:sp>
+      <p:sp>
+        <p:nvSpPr>
+          <p:cNvPr id="10" name="Content Placeholder 9">
+            <a:extLst>
+              <a:ext uri="{FF2B5EF4-FFF2-40B4-BE49-F238E27FC236}">
+                <a16:creationId xmlns:a16="http://schemas.microsoft.com/office/drawing/2014/main" id="{B4D1A5DC-1100-480C-87E4-0AFD1C3CED93}"/>
+              </a:ext>
+            </a:extLst>
+          </p:cNvPr>
+          <p:cNvSpPr>
+            <a:spLocks noGrp="1"/>
+          </p:cNvSpPr>
+          <p:nvPr>
+            <p:ph sz="quarter" idx="14"/>
+          </p:nvPr>
+        </p:nvSpPr>
+        <p:spPr>
+          <a:xfrm>
+            <a:off x="457201" y="2286000"/>
+            <a:ext cx="5435600" cy="4005263"/>
+          </a:xfrm>
+        </p:spPr>
+        <p:txBody>
+          <a:bodyPr>
+            <a:normAutofit/>
+          </a:bodyPr>
+          <a:lstStyle/>
+          <a:p>
+            <a:r>
+              <a:rPr lang="en-US" dirty="0"/>
+              <a:t>Insert short company intro</a:t>
+            </a:r>
+          </a:p>
+        </p:txBody>
+      </p:sp>
+      <p:sp>
+        <p:nvSpPr>
+          <p:cNvPr id="19" name="Slide Number Placeholder 18">
+            <a:extLst>
+              <a:ext uri="{FF2B5EF4-FFF2-40B4-BE49-F238E27FC236}">
+                <a16:creationId xmlns:a16="http://schemas.microsoft.com/office/drawing/2014/main" id="{7A6642A3-9BB0-4B52-BD06-47FF8A2F9F9C}"/>
+              </a:ext>
+            </a:extLst>
+          </p:cNvPr>
+          <p:cNvSpPr>
+            <a:spLocks noGrp="1"/>
+          </p:cNvSpPr>
+          <p:nvPr>
+            <p:ph type="sldNum" sz="quarter" idx="12"/>
+          </p:nvPr>
+        </p:nvSpPr>
+        <p:spPr>
+          <a:xfrm>
+            <a:off x="8610600" y="6400800"/>
+            <a:ext cx="2743200" cy="365125"/>
+          </a:xfrm>
+        </p:spPr>
+        <p:txBody>
+          <a:bodyPr/>
+          <a:lstStyle/>
+          <a:p>
+            <a:fld id="{DFA5D71E-5CDF-4C93-8A75-5B916FDC5BEA}" type="slidenum">
+              <a:rPr lang="en-US" smtClean="0"/>
+              <a:pPr/>
+              <a:t>2</a:t>
+            </a:fld>
+            <a:endParaRPr lang="en-US" dirty="0"/>
+          </a:p>
+        </p:txBody>
+      </p:sp>
+      <p:sp useBgFill="1">
+        <p:nvSpPr>
+          <p:cNvPr id="12" name="Oval 11">
+            <a:extLst>
+              <a:ext uri="{FF2B5EF4-FFF2-40B4-BE49-F238E27FC236}">
+                <a16:creationId xmlns:a16="http://schemas.microsoft.com/office/drawing/2014/main" id="{918C23BF-2500-45DF-A596-0FF5E4641EF9}"/>
+              </a:ext>
+              <a:ext uri="{C183D7F6-B498-43B3-948B-1728B52AA6E4}">
+                <adec:decorative xmlns:adec="http://schemas.microsoft.com/office/drawing/2017/decorative" val="1"/>
+              </a:ext>
+            </a:extLst>
+          </p:cNvPr>
+          <p:cNvSpPr/>
+          <p:nvPr/>
+        </p:nvSpPr>
+        <p:spPr>
+          <a:xfrm rot="10800000">
+            <a:off x="11474676" y="5428705"/>
+            <a:ext cx="425081" cy="425081"/>
+          </a:xfrm>
+          <a:prstGeom prst="ellipse">
+            <a:avLst/>
+          </a:prstGeom>
+          <a:ln w="3848" cap="flat">
+            <a:noFill/>
+            <a:prstDash val="solid"/>
+            <a:miter/>
+          </a:ln>
+          <a:effectLst>
+            <a:glow rad="152400">
+              <a:srgbClr val="000000">
+                <a:alpha val="4000"/>
+              </a:srgbClr>
+            </a:glow>
+            <a:outerShdw blurRad="101600" dist="38100" dir="16200000" rotWithShape="0">
+              <a:srgbClr val="000000">
+                <a:alpha val="5000"/>
+              </a:srgbClr>
+            </a:outerShdw>
+          </a:effectLst>
+        </p:spPr>
+        <p:txBody>
+          <a:bodyPr rtlCol="0" anchor="ctr"/>
+          <a:lstStyle/>
+          <a:p>
+            <a:endParaRPr lang="en-US" dirty="0"/>
+          </a:p>
+        </p:txBody>
+      </p:sp>
+      <p:pic>
+        <p:nvPicPr>
+          <p:cNvPr id="2" name="Picture Placeholder 18">
+            <a:extLst>
+              <a:ext uri="{FF2B5EF4-FFF2-40B4-BE49-F238E27FC236}">
+                <a16:creationId xmlns:a16="http://schemas.microsoft.com/office/drawing/2014/main" id="{8BE2DD55-E9F9-A7C9-0E13-38F460BA7B8D}"/>
+              </a:ext>
+            </a:extLst>
+          </p:cNvPr>
+          <p:cNvPicPr preferRelativeResize="0">
+            <a:picLocks/>
+          </p:cNvPicPr>
+          <p:nvPr/>
+        </p:nvPicPr>
+        <p:blipFill>
+          <a:blip r:embed="rId3"/>
+          <a:srcRect t="182" b="182"/>
+          <a:stretch/>
+        </p:blipFill>
+        <p:spPr>
+          <a:xfrm>
+            <a:off x="6931919" y="2007858"/>
+            <a:ext cx="4603616" cy="4454278"/>
+          </a:xfrm>
+          <a:prstGeom prst="rect">
+            <a:avLst/>
+          </a:prstGeom>
+        </p:spPr>
+      </p:pic>
+    </p:spTree>
+    <p:extLst>
+      <p:ext uri="{BB962C8B-B14F-4D97-AF65-F5344CB8AC3E}">
+        <p14:creationId xmlns:p14="http://schemas.microsoft.com/office/powerpoint/2010/main" val="2704700965"/>
+      </p:ext>
+    </p:extLst>
+  </p:cSld>
+  <p:clrMapOvr>
+    <a:masterClrMapping/>
+  </p:clrMapOvr>
+</p:sld>
+</file>
+
+<file path=ppt/slides/slide3.xml><?xml version="1.0" encoding="utf-8"?>
 <p:sld xmlns:a="http://schemas.openxmlformats.org/drawingml/2006/main" xmlns:r="http://schemas.openxmlformats.org/officeDocument/2006/relationships" xmlns:p="http://schemas.openxmlformats.org/presentationml/2006/main">
   <p:cSld>
     <p:spTree>
@@ -23751,7 +24259,7 @@
             <a:fld id="{DFA5D71E-5CDF-4C93-8A75-5B916FDC5BEA}" type="slidenum">
               <a:rPr lang="en-US" smtClean="0"/>
               <a:pPr/>
-              <a:t>2</a:t>
+              <a:t>3</a:t>
             </a:fld>
             <a:endParaRPr lang="en-US" dirty="0"/>
           </a:p>
@@ -24052,7 +24560,7 @@
 </p:sld>
 </file>
 
-<file path=ppt/slides/slide3.xml><?xml version="1.0" encoding="utf-8"?>
+<file path=ppt/slides/slide4.xml><?xml version="1.0" encoding="utf-8"?>
 <p:sld xmlns:a="http://schemas.openxmlformats.org/drawingml/2006/main" xmlns:r="http://schemas.openxmlformats.org/officeDocument/2006/relationships" xmlns:p="http://schemas.openxmlformats.org/presentationml/2006/main">
   <p:cSld>
     <p:spTree>
@@ -24194,7 +24702,7 @@
             <a:fld id="{DFA5D71E-5CDF-4C93-8A75-5B916FDC5BEA}" type="slidenum">
               <a:rPr lang="en-US" smtClean="0"/>
               <a:pPr/>
-              <a:t>3</a:t>
+              <a:t>4</a:t>
             </a:fld>
             <a:endParaRPr lang="en-US" dirty="0"/>
           </a:p>
@@ -24262,7 +24770,7 @@
 </p:sld>
 </file>
 
-<file path=ppt/slides/slide4.xml><?xml version="1.0" encoding="utf-8"?>
+<file path=ppt/slides/slide5.xml><?xml version="1.0" encoding="utf-8"?>
 <p:sld xmlns:a="http://schemas.openxmlformats.org/drawingml/2006/main" xmlns:r="http://schemas.openxmlformats.org/officeDocument/2006/relationships" xmlns:p="http://schemas.openxmlformats.org/presentationml/2006/main">
   <p:cSld>
     <p:spTree>
@@ -24404,7 +24912,7 @@
             <a:fld id="{DFA5D71E-5CDF-4C93-8A75-5B916FDC5BEA}" type="slidenum">
               <a:rPr lang="en-US" smtClean="0"/>
               <a:pPr/>
-              <a:t>4</a:t>
+              <a:t>5</a:t>
             </a:fld>
             <a:endParaRPr lang="en-US" dirty="0"/>
           </a:p>
@@ -24472,7 +24980,7 @@
 </p:sld>
 </file>
 
-<file path=ppt/slides/slide5.xml><?xml version="1.0" encoding="utf-8"?>
+<file path=ppt/slides/slide6.xml><?xml version="1.0" encoding="utf-8"?>
 <p:sld xmlns:a="http://schemas.openxmlformats.org/drawingml/2006/main" xmlns:r="http://schemas.openxmlformats.org/officeDocument/2006/relationships" xmlns:p="http://schemas.openxmlformats.org/presentationml/2006/main">
   <p:cSld>
     <p:spTree>
@@ -24693,7 +25201,7 @@
             <a:fld id="{DFA5D71E-5CDF-4C93-8A75-5B916FDC5BEA}" type="slidenum">
               <a:rPr lang="en-US" smtClean="0"/>
               <a:pPr/>
-              <a:t>5</a:t>
+              <a:t>6</a:t>
             </a:fld>
             <a:endParaRPr lang="en-US" dirty="0"/>
           </a:p>
@@ -24712,7 +25220,7 @@
 </p:sld>
 </file>
 
-<file path=ppt/slides/slide6.xml><?xml version="1.0" encoding="utf-8"?>
+<file path=ppt/slides/slide7.xml><?xml version="1.0" encoding="utf-8"?>
 <p:sld xmlns:a="http://schemas.openxmlformats.org/drawingml/2006/main" xmlns:r="http://schemas.openxmlformats.org/officeDocument/2006/relationships" xmlns:p="http://schemas.openxmlformats.org/presentationml/2006/main">
   <p:cSld>
     <p:spTree>
@@ -24858,7 +25366,7 @@
             <a:fld id="{DFA5D71E-5CDF-4C93-8A75-5B916FDC5BEA}" type="slidenum">
               <a:rPr lang="en-US" smtClean="0"/>
               <a:pPr/>
-              <a:t>6</a:t>
+              <a:t>7</a:t>
             </a:fld>
             <a:endParaRPr lang="en-US" dirty="0"/>
           </a:p>
@@ -24908,7 +25416,7 @@
 </p:sld>
 </file>
 
-<file path=ppt/slides/slide7.xml><?xml version="1.0" encoding="utf-8"?>
+<file path=ppt/slides/slide8.xml><?xml version="1.0" encoding="utf-8"?>
 <p:sld xmlns:a="http://schemas.openxmlformats.org/drawingml/2006/main" xmlns:r="http://schemas.openxmlformats.org/officeDocument/2006/relationships" xmlns:p="http://schemas.openxmlformats.org/presentationml/2006/main">
   <p:cSld>
     <p:spTree>
@@ -25054,7 +25562,7 @@
             <a:fld id="{DFA5D71E-5CDF-4C93-8A75-5B916FDC5BEA}" type="slidenum">
               <a:rPr lang="en-US" smtClean="0"/>
               <a:pPr/>
-              <a:t>7</a:t>
+              <a:t>8</a:t>
             </a:fld>
             <a:endParaRPr lang="en-US" dirty="0"/>
           </a:p>
@@ -25527,7 +26035,7 @@
 </p:sld>
 </file>
 
-<file path=ppt/slides/slide8.xml><?xml version="1.0" encoding="utf-8"?>
+<file path=ppt/slides/slide9.xml><?xml version="1.0" encoding="utf-8"?>
 <p:sld xmlns:a="http://schemas.openxmlformats.org/drawingml/2006/main" xmlns:r="http://schemas.openxmlformats.org/officeDocument/2006/relationships" xmlns:p="http://schemas.openxmlformats.org/presentationml/2006/main">
   <p:cSld>
     <p:spTree>
@@ -25736,7 +26244,7 @@
             <a:fld id="{DFA5D71E-5CDF-4C93-8A75-5B916FDC5BEA}" type="slidenum">
               <a:rPr lang="en-US" smtClean="0"/>
               <a:pPr/>
-              <a:t>8</a:t>
+              <a:t>9</a:t>
             </a:fld>
             <a:endParaRPr lang="en-US" dirty="0"/>
           </a:p>
@@ -25746,202 +26254,6 @@
     <p:extLst>
       <p:ext uri="{BB962C8B-B14F-4D97-AF65-F5344CB8AC3E}">
         <p14:creationId xmlns:p14="http://schemas.microsoft.com/office/powerpoint/2010/main" val="2779304341"/>
-      </p:ext>
-    </p:extLst>
-  </p:cSld>
-  <p:clrMapOvr>
-    <a:masterClrMapping/>
-  </p:clrMapOvr>
-</p:sld>
-</file>
-
-<file path=ppt/slides/slide9.xml><?xml version="1.0" encoding="utf-8"?>
-<p:sld xmlns:a="http://schemas.openxmlformats.org/drawingml/2006/main" xmlns:r="http://schemas.openxmlformats.org/officeDocument/2006/relationships" xmlns:p="http://schemas.openxmlformats.org/presentationml/2006/main">
-  <p:cSld>
-    <p:spTree>
-      <p:nvGrpSpPr>
-        <p:cNvPr id="1" name=""/>
-        <p:cNvGrpSpPr/>
-        <p:nvPr/>
-      </p:nvGrpSpPr>
-      <p:grpSpPr>
-        <a:xfrm>
-          <a:off x="0" y="0"/>
-          <a:ext cx="0" cy="0"/>
-          <a:chOff x="0" y="0"/>
-          <a:chExt cx="0" cy="0"/>
-        </a:xfrm>
-      </p:grpSpPr>
-      <p:sp>
-        <p:nvSpPr>
-          <p:cNvPr id="14" name="Title 13">
-            <a:extLst>
-              <a:ext uri="{FF2B5EF4-FFF2-40B4-BE49-F238E27FC236}">
-                <a16:creationId xmlns:a16="http://schemas.microsoft.com/office/drawing/2014/main" id="{9388704E-D67C-4378-8FA9-A83871F51038}"/>
-              </a:ext>
-            </a:extLst>
-          </p:cNvPr>
-          <p:cNvSpPr>
-            <a:spLocks noGrp="1"/>
-          </p:cNvSpPr>
-          <p:nvPr>
-            <p:ph type="title"/>
-          </p:nvPr>
-        </p:nvSpPr>
-        <p:spPr>
-          <a:xfrm>
-            <a:off x="457200" y="544786"/>
-            <a:ext cx="11238346" cy="836339"/>
-          </a:xfrm>
-        </p:spPr>
-        <p:txBody>
-          <a:bodyPr/>
-          <a:lstStyle/>
-          <a:p>
-            <a:r>
-              <a:rPr lang="en-US" dirty="0"/>
-              <a:t>Team</a:t>
-            </a:r>
-          </a:p>
-        </p:txBody>
-      </p:sp>
-      <p:sp>
-        <p:nvSpPr>
-          <p:cNvPr id="15" name="Date Placeholder 14">
-            <a:extLst>
-              <a:ext uri="{FF2B5EF4-FFF2-40B4-BE49-F238E27FC236}">
-                <a16:creationId xmlns:a16="http://schemas.microsoft.com/office/drawing/2014/main" id="{B83F0619-16A4-44CD-BC6C-D8788D7869AF}"/>
-              </a:ext>
-            </a:extLst>
-          </p:cNvPr>
-          <p:cNvSpPr>
-            <a:spLocks noGrp="1"/>
-          </p:cNvSpPr>
-          <p:nvPr>
-            <p:ph type="dt" sz="half" idx="10"/>
-          </p:nvPr>
-        </p:nvSpPr>
-        <p:spPr>
-          <a:xfrm>
-            <a:off x="838200" y="6400800"/>
-            <a:ext cx="2743200" cy="365125"/>
-          </a:xfrm>
-        </p:spPr>
-        <p:txBody>
-          <a:bodyPr/>
-          <a:lstStyle/>
-          <a:p>
-            <a:r>
-              <a:rPr lang="en-US"/>
-              <a:t>2/2/20XX</a:t>
-            </a:r>
-            <a:endParaRPr lang="en-US" dirty="0"/>
-          </a:p>
-        </p:txBody>
-      </p:sp>
-      <p:sp>
-        <p:nvSpPr>
-          <p:cNvPr id="16" name="Footer Placeholder 15">
-            <a:extLst>
-              <a:ext uri="{FF2B5EF4-FFF2-40B4-BE49-F238E27FC236}">
-                <a16:creationId xmlns:a16="http://schemas.microsoft.com/office/drawing/2014/main" id="{365C13F4-B6C5-4ABF-B9CF-27AE8394981F}"/>
-              </a:ext>
-            </a:extLst>
-          </p:cNvPr>
-          <p:cNvSpPr>
-            <a:spLocks noGrp="1"/>
-          </p:cNvSpPr>
-          <p:nvPr>
-            <p:ph type="ftr" sz="quarter" idx="11"/>
-          </p:nvPr>
-        </p:nvSpPr>
-        <p:spPr>
-          <a:xfrm>
-            <a:off x="4038600" y="6400800"/>
-            <a:ext cx="4114800" cy="365125"/>
-          </a:xfrm>
-        </p:spPr>
-        <p:txBody>
-          <a:bodyPr/>
-          <a:lstStyle/>
-          <a:p>
-            <a:r>
-              <a:rPr lang="en-US" dirty="0"/>
-              <a:t>PRESENTATION TITLE</a:t>
-            </a:r>
-          </a:p>
-        </p:txBody>
-      </p:sp>
-      <p:sp>
-        <p:nvSpPr>
-          <p:cNvPr id="17" name="Slide Number Placeholder 16">
-            <a:extLst>
-              <a:ext uri="{FF2B5EF4-FFF2-40B4-BE49-F238E27FC236}">
-                <a16:creationId xmlns:a16="http://schemas.microsoft.com/office/drawing/2014/main" id="{158AAB3C-64BD-4A61-9806-A8BF13DDA6D6}"/>
-              </a:ext>
-            </a:extLst>
-          </p:cNvPr>
-          <p:cNvSpPr>
-            <a:spLocks noGrp="1"/>
-          </p:cNvSpPr>
-          <p:nvPr>
-            <p:ph type="sldNum" sz="quarter" idx="12"/>
-          </p:nvPr>
-        </p:nvSpPr>
-        <p:spPr>
-          <a:xfrm>
-            <a:off x="8610600" y="6400800"/>
-            <a:ext cx="2743200" cy="365125"/>
-          </a:xfrm>
-        </p:spPr>
-        <p:txBody>
-          <a:bodyPr/>
-          <a:lstStyle/>
-          <a:p>
-            <a:fld id="{DFA5D71E-5CDF-4C93-8A75-5B916FDC5BEA}" type="slidenum">
-              <a:rPr lang="en-US" smtClean="0"/>
-              <a:pPr/>
-              <a:t>9</a:t>
-            </a:fld>
-            <a:endParaRPr lang="en-US" dirty="0"/>
-          </a:p>
-        </p:txBody>
-      </p:sp>
-      <p:graphicFrame>
-        <p:nvGraphicFramePr>
-          <p:cNvPr id="19" name="Content Placeholder 2" descr="Team Placeholder ">
-            <a:extLst>
-              <a:ext uri="{FF2B5EF4-FFF2-40B4-BE49-F238E27FC236}">
-                <a16:creationId xmlns:a16="http://schemas.microsoft.com/office/drawing/2014/main" id="{3EAC8B30-4F38-409D-B2C5-1D1A1DD71808}"/>
-              </a:ext>
-            </a:extLst>
-          </p:cNvPr>
-          <p:cNvGraphicFramePr>
-            <a:graphicFrameLocks noGrp="1"/>
-          </p:cNvGraphicFramePr>
-          <p:nvPr>
-            <p:ph sz="quarter" idx="13"/>
-            <p:extLst>
-              <p:ext uri="{D42A27DB-BD31-4B8C-83A1-F6EECF244321}">
-                <p14:modId xmlns:p14="http://schemas.microsoft.com/office/powerpoint/2010/main" val="1858787959"/>
-              </p:ext>
-            </p:extLst>
-          </p:nvPr>
-        </p:nvGraphicFramePr>
-        <p:xfrm>
-          <a:off x="390525" y="1962150"/>
-          <a:ext cx="11407775" cy="4351338"/>
-        </p:xfrm>
-        <a:graphic>
-          <a:graphicData uri="http://schemas.openxmlformats.org/drawingml/2006/diagram">
-            <dgm:relIds xmlns:dgm="http://schemas.openxmlformats.org/drawingml/2006/diagram" xmlns:r="http://schemas.openxmlformats.org/officeDocument/2006/relationships" r:dm="rId3" r:lo="rId4" r:qs="rId5" r:cs="rId6"/>
-          </a:graphicData>
-        </a:graphic>
-      </p:graphicFrame>
-    </p:spTree>
-    <p:extLst>
-      <p:ext uri="{BB962C8B-B14F-4D97-AF65-F5344CB8AC3E}">
-        <p14:creationId xmlns:p14="http://schemas.microsoft.com/office/powerpoint/2010/main" val="4155872974"/>
       </p:ext>
     </p:extLst>
   </p:cSld>
@@ -26743,6 +27055,34 @@
 </file>
 
 <file path=customXml/item1.xml><?xml version="1.0" encoding="utf-8"?>
+<p:properties xmlns:p="http://schemas.microsoft.com/office/2006/metadata/properties" xmlns:xsi="http://www.w3.org/2001/XMLSchema-instance" xmlns:pc="http://schemas.microsoft.com/office/infopath/2007/PartnerControls">
+  <documentManagement>
+    <_ip_UnifiedCompliancePolicyUIAction xmlns="http://schemas.microsoft.com/sharepoint/v3" xsi:nil="true"/>
+    <Image xmlns="71af3243-3dd4-4a8d-8c0d-dd76da1f02a5">
+      <Url xsi:nil="true"/>
+      <Description xsi:nil="true"/>
+    </Image>
+    <Status xmlns="71af3243-3dd4-4a8d-8c0d-dd76da1f02a5">Not started</Status>
+    <_ip_UnifiedCompliancePolicyProperties xmlns="http://schemas.microsoft.com/sharepoint/v3" xsi:nil="true"/>
+    <lcf76f155ced4ddcb4097134ff3c332f xmlns="71af3243-3dd4-4a8d-8c0d-dd76da1f02a5">
+      <Terms xmlns="http://schemas.microsoft.com/office/infopath/2007/PartnerControls"/>
+    </lcf76f155ced4ddcb4097134ff3c332f>
+    <TaxCatchAll xmlns="230e9df3-be65-4c73-a93b-d1236ebd677e"/>
+    <MediaServiceKeyPoints xmlns="71af3243-3dd4-4a8d-8c0d-dd76da1f02a5" xsi:nil="true"/>
+  </documentManagement>
+</p:properties>
+</file>
+
+<file path=customXml/item2.xml><?xml version="1.0" encoding="utf-8"?>
+<?mso-contentType ?>
+<FormTemplates xmlns="http://schemas.microsoft.com/sharepoint/v3/contenttype/forms">
+  <Display>DocumentLibraryForm</Display>
+  <Edit>DocumentLibraryForm</Edit>
+  <New>DocumentLibraryForm</New>
+</FormTemplates>
+</file>
+
+<file path=customXml/item3.xml><?xml version="1.0" encoding="utf-8"?>
 <ct:contentTypeSchema xmlns:ct="http://schemas.microsoft.com/office/2006/metadata/contentType" xmlns:ma="http://schemas.microsoft.com/office/2006/metadata/properties/metaAttributes" ct:_="" ma:_="" ma:contentTypeName="Document" ma:contentTypeID="0x01010079F111ED35F8CC479449609E8A0923A6" ma:contentTypeVersion="18" ma:contentTypeDescription="Create a new document." ma:contentTypeScope="" ma:versionID="22a266b9fa9a230c5a512669d8b298c3">
   <xsd:schema xmlns:xsd="http://www.w3.org/2001/XMLSchema" xmlns:xs="http://www.w3.org/2001/XMLSchema" xmlns:p="http://schemas.microsoft.com/office/2006/metadata/properties" xmlns:ns1="http://schemas.microsoft.com/sharepoint/v3" xmlns:ns2="71af3243-3dd4-4a8d-8c0d-dd76da1f02a5" xmlns:ns3="16c05727-aa75-4e4a-9b5f-8a80a1165891" xmlns:ns4="230e9df3-be65-4c73-a93b-d1236ebd677e" targetNamespace="http://schemas.microsoft.com/office/2006/metadata/properties" ma:root="true" ma:fieldsID="eddc33fff6b14141ee5c74a0d29ea6a1" ns1:_="" ns2:_="" ns3:_="" ns4:_="">
     <xsd:import namespace="http://schemas.microsoft.com/sharepoint/v3"/>
@@ -27018,35 +27358,27 @@
 </ct:contentTypeSchema>
 </file>
 
-<file path=customXml/item2.xml><?xml version="1.0" encoding="utf-8"?>
-<?mso-contentType ?>
-<FormTemplates xmlns="http://schemas.microsoft.com/sharepoint/v3/contenttype/forms">
-  <Display>DocumentLibraryForm</Display>
-  <Edit>DocumentLibraryForm</Edit>
-  <New>DocumentLibraryForm</New>
-</FormTemplates>
+<file path=customXml/itemProps1.xml><?xml version="1.0" encoding="utf-8"?>
+<ds:datastoreItem xmlns:ds="http://schemas.openxmlformats.org/officeDocument/2006/customXml" ds:itemID="{46275531-F059-4661-BC99-5916D6312804}">
+  <ds:schemaRefs>
+    <ds:schemaRef ds:uri="http://schemas.microsoft.com/office/2006/metadata/properties"/>
+    <ds:schemaRef ds:uri="http://schemas.microsoft.com/office/infopath/2007/PartnerControls"/>
+    <ds:schemaRef ds:uri="http://schemas.microsoft.com/sharepoint/v3"/>
+    <ds:schemaRef ds:uri="71af3243-3dd4-4a8d-8c0d-dd76da1f02a5"/>
+    <ds:schemaRef ds:uri="230e9df3-be65-4c73-a93b-d1236ebd677e"/>
+  </ds:schemaRefs>
+</ds:datastoreItem>
 </file>
 
-<file path=customXml/item3.xml><?xml version="1.0" encoding="utf-8"?>
-<p:properties xmlns:p="http://schemas.microsoft.com/office/2006/metadata/properties" xmlns:xsi="http://www.w3.org/2001/XMLSchema-instance" xmlns:pc="http://schemas.microsoft.com/office/infopath/2007/PartnerControls">
-  <documentManagement>
-    <_ip_UnifiedCompliancePolicyUIAction xmlns="http://schemas.microsoft.com/sharepoint/v3" xsi:nil="true"/>
-    <Image xmlns="71af3243-3dd4-4a8d-8c0d-dd76da1f02a5">
-      <Url xsi:nil="true"/>
-      <Description xsi:nil="true"/>
-    </Image>
-    <Status xmlns="71af3243-3dd4-4a8d-8c0d-dd76da1f02a5">Not started</Status>
-    <_ip_UnifiedCompliancePolicyProperties xmlns="http://schemas.microsoft.com/sharepoint/v3" xsi:nil="true"/>
-    <lcf76f155ced4ddcb4097134ff3c332f xmlns="71af3243-3dd4-4a8d-8c0d-dd76da1f02a5">
-      <Terms xmlns="http://schemas.microsoft.com/office/infopath/2007/PartnerControls"/>
-    </lcf76f155ced4ddcb4097134ff3c332f>
-    <TaxCatchAll xmlns="230e9df3-be65-4c73-a93b-d1236ebd677e"/>
-    <MediaServiceKeyPoints xmlns="71af3243-3dd4-4a8d-8c0d-dd76da1f02a5" xsi:nil="true"/>
-  </documentManagement>
-</p:properties>
+<file path=customXml/itemProps2.xml><?xml version="1.0" encoding="utf-8"?>
+<ds:datastoreItem xmlns:ds="http://schemas.openxmlformats.org/officeDocument/2006/customXml" ds:itemID="{81E232BF-B213-4F24-BBD3-1528B29F127A}">
+  <ds:schemaRefs>
+    <ds:schemaRef ds:uri="http://schemas.microsoft.com/sharepoint/v3/contenttype/forms"/>
+  </ds:schemaRefs>
+</ds:datastoreItem>
 </file>
 
-<file path=customXml/itemProps1.xml><?xml version="1.0" encoding="utf-8"?>
+<file path=customXml/itemProps3.xml><?xml version="1.0" encoding="utf-8"?>
 <ds:datastoreItem xmlns:ds="http://schemas.openxmlformats.org/officeDocument/2006/customXml" ds:itemID="{F6806A6F-3B78-4957-BAA5-95F2FE58D16D}">
   <ds:schemaRefs>
     <ds:schemaRef ds:uri="http://schemas.microsoft.com/office/2006/metadata/contentType"/>
@@ -27067,26 +27399,6 @@
 </ds:datastoreItem>
 </file>
 
-<file path=customXml/itemProps2.xml><?xml version="1.0" encoding="utf-8"?>
-<ds:datastoreItem xmlns:ds="http://schemas.openxmlformats.org/officeDocument/2006/customXml" ds:itemID="{81E232BF-B213-4F24-BBD3-1528B29F127A}">
-  <ds:schemaRefs>
-    <ds:schemaRef ds:uri="http://schemas.microsoft.com/sharepoint/v3/contenttype/forms"/>
-  </ds:schemaRefs>
-</ds:datastoreItem>
-</file>
-
-<file path=customXml/itemProps3.xml><?xml version="1.0" encoding="utf-8"?>
-<ds:datastoreItem xmlns:ds="http://schemas.openxmlformats.org/officeDocument/2006/customXml" ds:itemID="{46275531-F059-4661-BC99-5916D6312804}">
-  <ds:schemaRefs>
-    <ds:schemaRef ds:uri="http://schemas.microsoft.com/office/2006/metadata/properties"/>
-    <ds:schemaRef ds:uri="http://schemas.microsoft.com/office/infopath/2007/PartnerControls"/>
-    <ds:schemaRef ds:uri="http://schemas.microsoft.com/sharepoint/v3"/>
-    <ds:schemaRef ds:uri="71af3243-3dd4-4a8d-8c0d-dd76da1f02a5"/>
-    <ds:schemaRef ds:uri="230e9df3-be65-4c73-a93b-d1236ebd677e"/>
-  </ds:schemaRefs>
-</ds:datastoreItem>
-</file>
-
 <file path=docMetadata/LabelInfo.xml><?xml version="1.0" encoding="utf-8"?>
 <clbl:labelList xmlns:clbl="http://schemas.microsoft.com/office/2020/mipLabelMetadata">
   <clbl:label id="{f42aa342-8706-4288-bd11-ebb85995028c}" enabled="1" method="Standard" siteId="{72f988bf-86f1-41af-91ab-2d7cd011db47}" removed="0"/>

</xml_diff>

<commit_message>
Updated the company motto on first slide of llama inc pitch slideshow
</commit_message>
<xml_diff>
--- a/LLAMA Inc.pptx
+++ b/LLAMA Inc.pptx
@@ -22166,7 +22166,7 @@
                   <a:schemeClr val="tx1"/>
                 </a:solidFill>
               </a:rPr>
-              <a:t>Insert motto here</a:t>
+              <a:t>Empowering communities with knowledge and care</a:t>
             </a:r>
           </a:p>
           <a:p>
@@ -27055,34 +27055,6 @@
 </file>
 
 <file path=customXml/item1.xml><?xml version="1.0" encoding="utf-8"?>
-<p:properties xmlns:p="http://schemas.microsoft.com/office/2006/metadata/properties" xmlns:xsi="http://www.w3.org/2001/XMLSchema-instance" xmlns:pc="http://schemas.microsoft.com/office/infopath/2007/PartnerControls">
-  <documentManagement>
-    <_ip_UnifiedCompliancePolicyUIAction xmlns="http://schemas.microsoft.com/sharepoint/v3" xsi:nil="true"/>
-    <Image xmlns="71af3243-3dd4-4a8d-8c0d-dd76da1f02a5">
-      <Url xsi:nil="true"/>
-      <Description xsi:nil="true"/>
-    </Image>
-    <Status xmlns="71af3243-3dd4-4a8d-8c0d-dd76da1f02a5">Not started</Status>
-    <_ip_UnifiedCompliancePolicyProperties xmlns="http://schemas.microsoft.com/sharepoint/v3" xsi:nil="true"/>
-    <lcf76f155ced4ddcb4097134ff3c332f xmlns="71af3243-3dd4-4a8d-8c0d-dd76da1f02a5">
-      <Terms xmlns="http://schemas.microsoft.com/office/infopath/2007/PartnerControls"/>
-    </lcf76f155ced4ddcb4097134ff3c332f>
-    <TaxCatchAll xmlns="230e9df3-be65-4c73-a93b-d1236ebd677e"/>
-    <MediaServiceKeyPoints xmlns="71af3243-3dd4-4a8d-8c0d-dd76da1f02a5" xsi:nil="true"/>
-  </documentManagement>
-</p:properties>
-</file>
-
-<file path=customXml/item2.xml><?xml version="1.0" encoding="utf-8"?>
-<?mso-contentType ?>
-<FormTemplates xmlns="http://schemas.microsoft.com/sharepoint/v3/contenttype/forms">
-  <Display>DocumentLibraryForm</Display>
-  <Edit>DocumentLibraryForm</Edit>
-  <New>DocumentLibraryForm</New>
-</FormTemplates>
-</file>
-
-<file path=customXml/item3.xml><?xml version="1.0" encoding="utf-8"?>
 <ct:contentTypeSchema xmlns:ct="http://schemas.microsoft.com/office/2006/metadata/contentType" xmlns:ma="http://schemas.microsoft.com/office/2006/metadata/properties/metaAttributes" ct:_="" ma:_="" ma:contentTypeName="Document" ma:contentTypeID="0x01010079F111ED35F8CC479449609E8A0923A6" ma:contentTypeVersion="18" ma:contentTypeDescription="Create a new document." ma:contentTypeScope="" ma:versionID="22a266b9fa9a230c5a512669d8b298c3">
   <xsd:schema xmlns:xsd="http://www.w3.org/2001/XMLSchema" xmlns:xs="http://www.w3.org/2001/XMLSchema" xmlns:p="http://schemas.microsoft.com/office/2006/metadata/properties" xmlns:ns1="http://schemas.microsoft.com/sharepoint/v3" xmlns:ns2="71af3243-3dd4-4a8d-8c0d-dd76da1f02a5" xmlns:ns3="16c05727-aa75-4e4a-9b5f-8a80a1165891" xmlns:ns4="230e9df3-be65-4c73-a93b-d1236ebd677e" targetNamespace="http://schemas.microsoft.com/office/2006/metadata/properties" ma:root="true" ma:fieldsID="eddc33fff6b14141ee5c74a0d29ea6a1" ns1:_="" ns2:_="" ns3:_="" ns4:_="">
     <xsd:import namespace="http://schemas.microsoft.com/sharepoint/v3"/>
@@ -27358,27 +27330,35 @@
 </ct:contentTypeSchema>
 </file>
 
-<file path=customXml/itemProps1.xml><?xml version="1.0" encoding="utf-8"?>
-<ds:datastoreItem xmlns:ds="http://schemas.openxmlformats.org/officeDocument/2006/customXml" ds:itemID="{46275531-F059-4661-BC99-5916D6312804}">
-  <ds:schemaRefs>
-    <ds:schemaRef ds:uri="http://schemas.microsoft.com/office/2006/metadata/properties"/>
-    <ds:schemaRef ds:uri="http://schemas.microsoft.com/office/infopath/2007/PartnerControls"/>
-    <ds:schemaRef ds:uri="http://schemas.microsoft.com/sharepoint/v3"/>
-    <ds:schemaRef ds:uri="71af3243-3dd4-4a8d-8c0d-dd76da1f02a5"/>
-    <ds:schemaRef ds:uri="230e9df3-be65-4c73-a93b-d1236ebd677e"/>
-  </ds:schemaRefs>
-</ds:datastoreItem>
+<file path=customXml/item2.xml><?xml version="1.0" encoding="utf-8"?>
+<?mso-contentType ?>
+<FormTemplates xmlns="http://schemas.microsoft.com/sharepoint/v3/contenttype/forms">
+  <Display>DocumentLibraryForm</Display>
+  <Edit>DocumentLibraryForm</Edit>
+  <New>DocumentLibraryForm</New>
+</FormTemplates>
 </file>
 
-<file path=customXml/itemProps2.xml><?xml version="1.0" encoding="utf-8"?>
-<ds:datastoreItem xmlns:ds="http://schemas.openxmlformats.org/officeDocument/2006/customXml" ds:itemID="{81E232BF-B213-4F24-BBD3-1528B29F127A}">
-  <ds:schemaRefs>
-    <ds:schemaRef ds:uri="http://schemas.microsoft.com/sharepoint/v3/contenttype/forms"/>
-  </ds:schemaRefs>
-</ds:datastoreItem>
+<file path=customXml/item3.xml><?xml version="1.0" encoding="utf-8"?>
+<p:properties xmlns:p="http://schemas.microsoft.com/office/2006/metadata/properties" xmlns:xsi="http://www.w3.org/2001/XMLSchema-instance" xmlns:pc="http://schemas.microsoft.com/office/infopath/2007/PartnerControls">
+  <documentManagement>
+    <_ip_UnifiedCompliancePolicyUIAction xmlns="http://schemas.microsoft.com/sharepoint/v3" xsi:nil="true"/>
+    <Image xmlns="71af3243-3dd4-4a8d-8c0d-dd76da1f02a5">
+      <Url xsi:nil="true"/>
+      <Description xsi:nil="true"/>
+    </Image>
+    <Status xmlns="71af3243-3dd4-4a8d-8c0d-dd76da1f02a5">Not started</Status>
+    <_ip_UnifiedCompliancePolicyProperties xmlns="http://schemas.microsoft.com/sharepoint/v3" xsi:nil="true"/>
+    <lcf76f155ced4ddcb4097134ff3c332f xmlns="71af3243-3dd4-4a8d-8c0d-dd76da1f02a5">
+      <Terms xmlns="http://schemas.microsoft.com/office/infopath/2007/PartnerControls"/>
+    </lcf76f155ced4ddcb4097134ff3c332f>
+    <TaxCatchAll xmlns="230e9df3-be65-4c73-a93b-d1236ebd677e"/>
+    <MediaServiceKeyPoints xmlns="71af3243-3dd4-4a8d-8c0d-dd76da1f02a5" xsi:nil="true"/>
+  </documentManagement>
+</p:properties>
 </file>
 
-<file path=customXml/itemProps3.xml><?xml version="1.0" encoding="utf-8"?>
+<file path=customXml/itemProps1.xml><?xml version="1.0" encoding="utf-8"?>
 <ds:datastoreItem xmlns:ds="http://schemas.openxmlformats.org/officeDocument/2006/customXml" ds:itemID="{F6806A6F-3B78-4957-BAA5-95F2FE58D16D}">
   <ds:schemaRefs>
     <ds:schemaRef ds:uri="http://schemas.microsoft.com/office/2006/metadata/contentType"/>
@@ -27399,6 +27379,26 @@
 </ds:datastoreItem>
 </file>
 
+<file path=customXml/itemProps2.xml><?xml version="1.0" encoding="utf-8"?>
+<ds:datastoreItem xmlns:ds="http://schemas.openxmlformats.org/officeDocument/2006/customXml" ds:itemID="{81E232BF-B213-4F24-BBD3-1528B29F127A}">
+  <ds:schemaRefs>
+    <ds:schemaRef ds:uri="http://schemas.microsoft.com/sharepoint/v3/contenttype/forms"/>
+  </ds:schemaRefs>
+</ds:datastoreItem>
+</file>
+
+<file path=customXml/itemProps3.xml><?xml version="1.0" encoding="utf-8"?>
+<ds:datastoreItem xmlns:ds="http://schemas.openxmlformats.org/officeDocument/2006/customXml" ds:itemID="{46275531-F059-4661-BC99-5916D6312804}">
+  <ds:schemaRefs>
+    <ds:schemaRef ds:uri="http://schemas.microsoft.com/office/2006/metadata/properties"/>
+    <ds:schemaRef ds:uri="http://schemas.microsoft.com/office/infopath/2007/PartnerControls"/>
+    <ds:schemaRef ds:uri="http://schemas.microsoft.com/sharepoint/v3"/>
+    <ds:schemaRef ds:uri="71af3243-3dd4-4a8d-8c0d-dd76da1f02a5"/>
+    <ds:schemaRef ds:uri="230e9df3-be65-4c73-a93b-d1236ebd677e"/>
+  </ds:schemaRefs>
+</ds:datastoreItem>
+</file>
+
 <file path=docMetadata/LabelInfo.xml><?xml version="1.0" encoding="utf-8"?>
 <clbl:labelList xmlns:clbl="http://schemas.microsoft.com/office/2020/mipLabelMetadata">
   <clbl:label id="{f42aa342-8706-4288-bd11-ebb85995028c}" enabled="1" method="Standard" siteId="{72f988bf-86f1-41af-91ab-2d7cd011db47}" removed="0"/>

</xml_diff>

<commit_message>
Added my name and title
</commit_message>
<xml_diff>
--- a/LLAMA Inc.pptx
+++ b/LLAMA Inc.pptx
@@ -3088,7 +3088,7 @@
                 <a:schemeClr val="accent2"/>
               </a:solidFill>
             </a:rPr>
-            <a:t>Name</a:t>
+            <a:t>Jonathan Hardwick</a:t>
           </a:r>
           <a:br>
             <a:rPr lang="en-US" sz="1600" dirty="0">
@@ -3098,14 +3098,19 @@
             </a:rPr>
           </a:br>
           <a:r>
-            <a:rPr lang="en-US" sz="1600" b="0" dirty="0">
+            <a:rPr lang="en-US" sz="1600" dirty="0">
               <a:solidFill>
                 <a:schemeClr val="tx1"/>
               </a:solidFill>
-              <a:latin typeface="+mn-lt"/>
             </a:rPr>
-            <a:t>Title</a:t>
+            <a:t>Senior Back-end Specialist</a:t>
           </a:r>
+          <a:endParaRPr lang="en-US" sz="1600" b="0" dirty="0">
+            <a:solidFill>
+              <a:schemeClr val="tx1"/>
+            </a:solidFill>
+            <a:latin typeface="+mn-lt"/>
+          </a:endParaRPr>
         </a:p>
       </dgm:t>
     </dgm:pt>
@@ -4639,7 +4644,7 @@
                 <a:schemeClr val="accent2"/>
               </a:solidFill>
             </a:rPr>
-            <a:t>Name</a:t>
+            <a:t>Jonathan Hardwick</a:t>
           </a:r>
           <a:br>
             <a:rPr lang="en-US" sz="1600" kern="1200" dirty="0">
@@ -4649,14 +4654,19 @@
             </a:rPr>
           </a:br>
           <a:r>
-            <a:rPr lang="en-US" sz="1600" b="0" kern="1200" dirty="0">
+            <a:rPr lang="en-US" sz="1600" kern="1200" dirty="0">
               <a:solidFill>
                 <a:schemeClr val="tx1"/>
               </a:solidFill>
-              <a:latin typeface="+mn-lt"/>
             </a:rPr>
-            <a:t>Title</a:t>
+            <a:t>Senior Back-end Specialist</a:t>
           </a:r>
+          <a:endParaRPr lang="en-US" sz="1600" b="0" kern="1200" dirty="0">
+            <a:solidFill>
+              <a:schemeClr val="tx1"/>
+            </a:solidFill>
+            <a:latin typeface="+mn-lt"/>
+          </a:endParaRPr>
         </a:p>
       </dsp:txBody>
       <dsp:txXfrm>
@@ -9071,7 +9081,7 @@
           <a:p>
             <a:fld id="{F250A84D-7040-4B66-A8F2-FF3252F0E77C}" type="datetimeFigureOut">
               <a:rPr lang="en-US" smtClean="0"/>
-              <a:t>1/26/2024</a:t>
+              <a:t>1/29/2024</a:t>
             </a:fld>
             <a:endParaRPr lang="en-US" dirty="0"/>
           </a:p>
@@ -9248,7 +9258,7 @@
           <a:p>
             <a:fld id="{47252D08-8B84-4A6F-9F01-611184AC5843}" type="datetimeFigureOut">
               <a:rPr lang="en-US" smtClean="0"/>
-              <a:t>1/26/2024</a:t>
+              <a:t>1/29/2024</a:t>
             </a:fld>
             <a:endParaRPr lang="en-US" dirty="0"/>
           </a:p>
@@ -22450,7 +22460,7 @@
             <p:ph sz="quarter" idx="13"/>
             <p:extLst>
               <p:ext uri="{D42A27DB-BD31-4B8C-83A1-F6EECF244321}">
-                <p14:modId xmlns:p14="http://schemas.microsoft.com/office/powerpoint/2010/main" val="1858787959"/>
+                <p14:modId xmlns:p14="http://schemas.microsoft.com/office/powerpoint/2010/main" val="2712883948"/>
               </p:ext>
             </p:extLst>
           </p:nvPr>
@@ -27055,6 +27065,15 @@
 </file>
 
 <file path=customXml/item1.xml><?xml version="1.0" encoding="utf-8"?>
+<?mso-contentType ?>
+<FormTemplates xmlns="http://schemas.microsoft.com/sharepoint/v3/contenttype/forms">
+  <Display>DocumentLibraryForm</Display>
+  <Edit>DocumentLibraryForm</Edit>
+  <New>DocumentLibraryForm</New>
+</FormTemplates>
+</file>
+
+<file path=customXml/item2.xml><?xml version="1.0" encoding="utf-8"?>
 <ct:contentTypeSchema xmlns:ct="http://schemas.microsoft.com/office/2006/metadata/contentType" xmlns:ma="http://schemas.microsoft.com/office/2006/metadata/properties/metaAttributes" ct:_="" ma:_="" ma:contentTypeName="Document" ma:contentTypeID="0x01010079F111ED35F8CC479449609E8A0923A6" ma:contentTypeVersion="18" ma:contentTypeDescription="Create a new document." ma:contentTypeScope="" ma:versionID="22a266b9fa9a230c5a512669d8b298c3">
   <xsd:schema xmlns:xsd="http://www.w3.org/2001/XMLSchema" xmlns:xs="http://www.w3.org/2001/XMLSchema" xmlns:p="http://schemas.microsoft.com/office/2006/metadata/properties" xmlns:ns1="http://schemas.microsoft.com/sharepoint/v3" xmlns:ns2="71af3243-3dd4-4a8d-8c0d-dd76da1f02a5" xmlns:ns3="16c05727-aa75-4e4a-9b5f-8a80a1165891" xmlns:ns4="230e9df3-be65-4c73-a93b-d1236ebd677e" targetNamespace="http://schemas.microsoft.com/office/2006/metadata/properties" ma:root="true" ma:fieldsID="eddc33fff6b14141ee5c74a0d29ea6a1" ns1:_="" ns2:_="" ns3:_="" ns4:_="">
     <xsd:import namespace="http://schemas.microsoft.com/sharepoint/v3"/>
@@ -27330,15 +27349,6 @@
 </ct:contentTypeSchema>
 </file>
 
-<file path=customXml/item2.xml><?xml version="1.0" encoding="utf-8"?>
-<?mso-contentType ?>
-<FormTemplates xmlns="http://schemas.microsoft.com/sharepoint/v3/contenttype/forms">
-  <Display>DocumentLibraryForm</Display>
-  <Edit>DocumentLibraryForm</Edit>
-  <New>DocumentLibraryForm</New>
-</FormTemplates>
-</file>
-
 <file path=customXml/item3.xml><?xml version="1.0" encoding="utf-8"?>
 <p:properties xmlns:p="http://schemas.microsoft.com/office/2006/metadata/properties" xmlns:xsi="http://www.w3.org/2001/XMLSchema-instance" xmlns:pc="http://schemas.microsoft.com/office/infopath/2007/PartnerControls">
   <documentManagement>
@@ -27359,6 +27369,14 @@
 </file>
 
 <file path=customXml/itemProps1.xml><?xml version="1.0" encoding="utf-8"?>
+<ds:datastoreItem xmlns:ds="http://schemas.openxmlformats.org/officeDocument/2006/customXml" ds:itemID="{81E232BF-B213-4F24-BBD3-1528B29F127A}">
+  <ds:schemaRefs>
+    <ds:schemaRef ds:uri="http://schemas.microsoft.com/sharepoint/v3/contenttype/forms"/>
+  </ds:schemaRefs>
+</ds:datastoreItem>
+</file>
+
+<file path=customXml/itemProps2.xml><?xml version="1.0" encoding="utf-8"?>
 <ds:datastoreItem xmlns:ds="http://schemas.openxmlformats.org/officeDocument/2006/customXml" ds:itemID="{F6806A6F-3B78-4957-BAA5-95F2FE58D16D}">
   <ds:schemaRefs>
     <ds:schemaRef ds:uri="http://schemas.microsoft.com/office/2006/metadata/contentType"/>
@@ -27375,14 +27393,6 @@
     <ds:schemaRef ds:uri="http://purl.org/dc/elements/1.1/"/>
     <ds:schemaRef ds:uri="http://purl.org/dc/terms/"/>
     <ds:schemaRef ds:uri="http://schemas.microsoft.com/internal/obd"/>
-  </ds:schemaRefs>
-</ds:datastoreItem>
-</file>
-
-<file path=customXml/itemProps2.xml><?xml version="1.0" encoding="utf-8"?>
-<ds:datastoreItem xmlns:ds="http://schemas.openxmlformats.org/officeDocument/2006/customXml" ds:itemID="{81E232BF-B213-4F24-BBD3-1528B29F127A}">
-  <ds:schemaRefs>
-    <ds:schemaRef ds:uri="http://schemas.microsoft.com/sharepoint/v3/contenttype/forms"/>
   </ds:schemaRefs>
 </ds:datastoreItem>
 </file>

</xml_diff>

<commit_message>
changed pic for support spot
</commit_message>
<xml_diff>
--- a/LLAMA Inc.pptx
+++ b/LLAMA Inc.pptx
@@ -24865,34 +24865,6 @@
           </a:p>
         </p:txBody>
       </p:sp>
-      <p:pic>
-        <p:nvPicPr>
-          <p:cNvPr id="20" name="Picture Placeholder 19">
-            <a:extLst>
-              <a:ext uri="{FF2B5EF4-FFF2-40B4-BE49-F238E27FC236}">
-                <a16:creationId xmlns:a16="http://schemas.microsoft.com/office/drawing/2014/main" id="{0BB4AD80-C4C9-48DF-AEB9-18EC3A792690}"/>
-              </a:ext>
-            </a:extLst>
-          </p:cNvPr>
-          <p:cNvPicPr>
-            <a:picLocks noGrp="1" noChangeAspect="1"/>
-          </p:cNvPicPr>
-          <p:nvPr>
-            <p:ph type="pic" sz="quarter" idx="13"/>
-          </p:nvPr>
-        </p:nvPicPr>
-        <p:blipFill>
-          <a:blip r:embed="rId3"/>
-          <a:srcRect t="12850" b="12850"/>
-          <a:stretch/>
-        </p:blipFill>
-        <p:spPr>
-          <a:xfrm>
-            <a:off x="5915324" y="2069194"/>
-            <a:ext cx="5727401" cy="4255406"/>
-          </a:xfrm>
-        </p:spPr>
-      </p:pic>
       <p:sp>
         <p:nvSpPr>
           <p:cNvPr id="19" name="Slide Number Placeholder 18">
@@ -24977,6 +24949,35 @@
           </a:p>
         </p:txBody>
       </p:sp>
+      <p:pic>
+        <p:nvPicPr>
+          <p:cNvPr id="2" name="Picture Placeholder 18">
+            <a:extLst>
+              <a:ext uri="{FF2B5EF4-FFF2-40B4-BE49-F238E27FC236}">
+                <a16:creationId xmlns:a16="http://schemas.microsoft.com/office/drawing/2014/main" id="{FEEE3D24-3C36-4556-C14F-6B6BF5004BED}"/>
+              </a:ext>
+            </a:extLst>
+          </p:cNvPr>
+          <p:cNvPicPr>
+            <a:picLocks noChangeAspect="1"/>
+          </p:cNvPicPr>
+          <p:nvPr/>
+        </p:nvPicPr>
+        <p:blipFill>
+          <a:blip r:embed="rId3"/>
+          <a:srcRect/>
+          <a:stretch/>
+        </p:blipFill>
+        <p:spPr>
+          <a:xfrm>
+            <a:off x="5899994" y="2069194"/>
+            <a:ext cx="5908715" cy="4192529"/>
+          </a:xfrm>
+          <a:prstGeom prst="rect">
+            <a:avLst/>
+          </a:prstGeom>
+        </p:spPr>
+      </p:pic>
     </p:spTree>
     <p:extLst>
       <p:ext uri="{BB962C8B-B14F-4D97-AF65-F5344CB8AC3E}">
@@ -27065,12 +27066,22 @@
 </file>
 
 <file path=customXml/item1.xml><?xml version="1.0" encoding="utf-8"?>
-<?mso-contentType ?>
-<FormTemplates xmlns="http://schemas.microsoft.com/sharepoint/v3/contenttype/forms">
-  <Display>DocumentLibraryForm</Display>
-  <Edit>DocumentLibraryForm</Edit>
-  <New>DocumentLibraryForm</New>
-</FormTemplates>
+<p:properties xmlns:p="http://schemas.microsoft.com/office/2006/metadata/properties" xmlns:xsi="http://www.w3.org/2001/XMLSchema-instance" xmlns:pc="http://schemas.microsoft.com/office/infopath/2007/PartnerControls">
+  <documentManagement>
+    <_ip_UnifiedCompliancePolicyUIAction xmlns="http://schemas.microsoft.com/sharepoint/v3" xsi:nil="true"/>
+    <Image xmlns="71af3243-3dd4-4a8d-8c0d-dd76da1f02a5">
+      <Url xsi:nil="true"/>
+      <Description xsi:nil="true"/>
+    </Image>
+    <Status xmlns="71af3243-3dd4-4a8d-8c0d-dd76da1f02a5">Not started</Status>
+    <_ip_UnifiedCompliancePolicyProperties xmlns="http://schemas.microsoft.com/sharepoint/v3" xsi:nil="true"/>
+    <lcf76f155ced4ddcb4097134ff3c332f xmlns="71af3243-3dd4-4a8d-8c0d-dd76da1f02a5">
+      <Terms xmlns="http://schemas.microsoft.com/office/infopath/2007/PartnerControls"/>
+    </lcf76f155ced4ddcb4097134ff3c332f>
+    <TaxCatchAll xmlns="230e9df3-be65-4c73-a93b-d1236ebd677e"/>
+    <MediaServiceKeyPoints xmlns="71af3243-3dd4-4a8d-8c0d-dd76da1f02a5" xsi:nil="true"/>
+  </documentManagement>
+</p:properties>
 </file>
 
 <file path=customXml/item2.xml><?xml version="1.0" encoding="utf-8"?>
@@ -27350,28 +27361,22 @@
 </file>
 
 <file path=customXml/item3.xml><?xml version="1.0" encoding="utf-8"?>
-<p:properties xmlns:p="http://schemas.microsoft.com/office/2006/metadata/properties" xmlns:xsi="http://www.w3.org/2001/XMLSchema-instance" xmlns:pc="http://schemas.microsoft.com/office/infopath/2007/PartnerControls">
-  <documentManagement>
-    <_ip_UnifiedCompliancePolicyUIAction xmlns="http://schemas.microsoft.com/sharepoint/v3" xsi:nil="true"/>
-    <Image xmlns="71af3243-3dd4-4a8d-8c0d-dd76da1f02a5">
-      <Url xsi:nil="true"/>
-      <Description xsi:nil="true"/>
-    </Image>
-    <Status xmlns="71af3243-3dd4-4a8d-8c0d-dd76da1f02a5">Not started</Status>
-    <_ip_UnifiedCompliancePolicyProperties xmlns="http://schemas.microsoft.com/sharepoint/v3" xsi:nil="true"/>
-    <lcf76f155ced4ddcb4097134ff3c332f xmlns="71af3243-3dd4-4a8d-8c0d-dd76da1f02a5">
-      <Terms xmlns="http://schemas.microsoft.com/office/infopath/2007/PartnerControls"/>
-    </lcf76f155ced4ddcb4097134ff3c332f>
-    <TaxCatchAll xmlns="230e9df3-be65-4c73-a93b-d1236ebd677e"/>
-    <MediaServiceKeyPoints xmlns="71af3243-3dd4-4a8d-8c0d-dd76da1f02a5" xsi:nil="true"/>
-  </documentManagement>
-</p:properties>
+<?mso-contentType ?>
+<FormTemplates xmlns="http://schemas.microsoft.com/sharepoint/v3/contenttype/forms">
+  <Display>DocumentLibraryForm</Display>
+  <Edit>DocumentLibraryForm</Edit>
+  <New>DocumentLibraryForm</New>
+</FormTemplates>
 </file>
 
 <file path=customXml/itemProps1.xml><?xml version="1.0" encoding="utf-8"?>
-<ds:datastoreItem xmlns:ds="http://schemas.openxmlformats.org/officeDocument/2006/customXml" ds:itemID="{81E232BF-B213-4F24-BBD3-1528B29F127A}">
+<ds:datastoreItem xmlns:ds="http://schemas.openxmlformats.org/officeDocument/2006/customXml" ds:itemID="{46275531-F059-4661-BC99-5916D6312804}">
   <ds:schemaRefs>
-    <ds:schemaRef ds:uri="http://schemas.microsoft.com/sharepoint/v3/contenttype/forms"/>
+    <ds:schemaRef ds:uri="http://schemas.microsoft.com/office/2006/metadata/properties"/>
+    <ds:schemaRef ds:uri="http://schemas.microsoft.com/office/infopath/2007/PartnerControls"/>
+    <ds:schemaRef ds:uri="http://schemas.microsoft.com/sharepoint/v3"/>
+    <ds:schemaRef ds:uri="71af3243-3dd4-4a8d-8c0d-dd76da1f02a5"/>
+    <ds:schemaRef ds:uri="230e9df3-be65-4c73-a93b-d1236ebd677e"/>
   </ds:schemaRefs>
 </ds:datastoreItem>
 </file>
@@ -27398,13 +27403,9 @@
 </file>
 
 <file path=customXml/itemProps3.xml><?xml version="1.0" encoding="utf-8"?>
-<ds:datastoreItem xmlns:ds="http://schemas.openxmlformats.org/officeDocument/2006/customXml" ds:itemID="{46275531-F059-4661-BC99-5916D6312804}">
+<ds:datastoreItem xmlns:ds="http://schemas.openxmlformats.org/officeDocument/2006/customXml" ds:itemID="{81E232BF-B213-4F24-BBD3-1528B29F127A}">
   <ds:schemaRefs>
-    <ds:schemaRef ds:uri="http://schemas.microsoft.com/office/2006/metadata/properties"/>
-    <ds:schemaRef ds:uri="http://schemas.microsoft.com/office/infopath/2007/PartnerControls"/>
-    <ds:schemaRef ds:uri="http://schemas.microsoft.com/sharepoint/v3"/>
-    <ds:schemaRef ds:uri="71af3243-3dd4-4a8d-8c0d-dd76da1f02a5"/>
-    <ds:schemaRef ds:uri="230e9df3-be65-4c73-a93b-d1236ebd677e"/>
+    <ds:schemaRef ds:uri="http://schemas.microsoft.com/sharepoint/v3/contenttype/forms"/>
   </ds:schemaRefs>
 </ds:datastoreItem>
 </file>

</xml_diff>

<commit_message>
Updated LLAMA inc presentation
</commit_message>
<xml_diff>
--- a/LLAMA Inc.pptx
+++ b/LLAMA Inc.pptx
@@ -23919,7 +23919,14 @@
           <a:p>
             <a:r>
               <a:rPr lang="en-US" sz="4000" dirty="0"/>
-              <a:t>L.L.A.M.A (Libraries, Life, and Medical Assistance)</a:t>
+              <a:t>L.L.A.M.A Inc. </a:t>
+            </a:r>
+            <a:br>
+              <a:rPr lang="en-US" sz="4000" dirty="0"/>
+            </a:br>
+            <a:r>
+              <a:rPr lang="en-US" sz="4000" dirty="0"/>
+              <a:t>(Libraries, Life, and Medical Assistance)</a:t>
             </a:r>
           </a:p>
         </p:txBody>
@@ -23942,8 +23949,8 @@
         </p:nvSpPr>
         <p:spPr>
           <a:xfrm>
-            <a:off x="457201" y="2286000"/>
-            <a:ext cx="5435600" cy="4005263"/>
+            <a:off x="457200" y="2286000"/>
+            <a:ext cx="5981927" cy="4005263"/>
           </a:xfrm>
         </p:spPr>
         <p:txBody>
@@ -23953,8 +23960,17 @@
           <a:lstStyle/>
           <a:p>
             <a:r>
-              <a:rPr lang="en-US" dirty="0"/>
-              <a:t>Insert short company intro</a:t>
+              <a:rPr lang="en-US" sz="2400" dirty="0"/>
+              <a:t>A multifaceted company that helps people in different ways.</a:t>
+            </a:r>
+          </a:p>
+          <a:p>
+            <a:endParaRPr lang="en-US" sz="2400" dirty="0"/>
+          </a:p>
+          <a:p>
+            <a:r>
+              <a:rPr lang="en-US" sz="2400" dirty="0"/>
+              <a:t> </a:t>
             </a:r>
           </a:p>
         </p:txBody>
@@ -24650,7 +24666,16 @@
           <a:p>
             <a:r>
               <a:rPr lang="en-US" dirty="0"/>
-              <a:t>Insert problem we will solve as well as personas </a:t>
+              <a:t>Insert problem we will solve as well as personas. </a:t>
+            </a:r>
+          </a:p>
+          <a:p>
+            <a:endParaRPr lang="en-US" dirty="0"/>
+          </a:p>
+          <a:p>
+            <a:r>
+              <a:rPr lang="en-US" dirty="0"/>
+              <a:t>Persona – Sam has a very large collection of video games, and they want to create a list of their games and consoles and determine their potential worth.</a:t>
             </a:r>
           </a:p>
         </p:txBody>
@@ -27066,22 +27091,12 @@
 </file>
 
 <file path=customXml/item1.xml><?xml version="1.0" encoding="utf-8"?>
-<p:properties xmlns:p="http://schemas.microsoft.com/office/2006/metadata/properties" xmlns:xsi="http://www.w3.org/2001/XMLSchema-instance" xmlns:pc="http://schemas.microsoft.com/office/infopath/2007/PartnerControls">
-  <documentManagement>
-    <_ip_UnifiedCompliancePolicyUIAction xmlns="http://schemas.microsoft.com/sharepoint/v3" xsi:nil="true"/>
-    <Image xmlns="71af3243-3dd4-4a8d-8c0d-dd76da1f02a5">
-      <Url xsi:nil="true"/>
-      <Description xsi:nil="true"/>
-    </Image>
-    <Status xmlns="71af3243-3dd4-4a8d-8c0d-dd76da1f02a5">Not started</Status>
-    <_ip_UnifiedCompliancePolicyProperties xmlns="http://schemas.microsoft.com/sharepoint/v3" xsi:nil="true"/>
-    <lcf76f155ced4ddcb4097134ff3c332f xmlns="71af3243-3dd4-4a8d-8c0d-dd76da1f02a5">
-      <Terms xmlns="http://schemas.microsoft.com/office/infopath/2007/PartnerControls"/>
-    </lcf76f155ced4ddcb4097134ff3c332f>
-    <TaxCatchAll xmlns="230e9df3-be65-4c73-a93b-d1236ebd677e"/>
-    <MediaServiceKeyPoints xmlns="71af3243-3dd4-4a8d-8c0d-dd76da1f02a5" xsi:nil="true"/>
-  </documentManagement>
-</p:properties>
+<?mso-contentType ?>
+<FormTemplates xmlns="http://schemas.microsoft.com/sharepoint/v3/contenttype/forms">
+  <Display>DocumentLibraryForm</Display>
+  <Edit>DocumentLibraryForm</Edit>
+  <New>DocumentLibraryForm</New>
+</FormTemplates>
 </file>
 
 <file path=customXml/item2.xml><?xml version="1.0" encoding="utf-8"?>
@@ -27361,22 +27376,28 @@
 </file>
 
 <file path=customXml/item3.xml><?xml version="1.0" encoding="utf-8"?>
-<?mso-contentType ?>
-<FormTemplates xmlns="http://schemas.microsoft.com/sharepoint/v3/contenttype/forms">
-  <Display>DocumentLibraryForm</Display>
-  <Edit>DocumentLibraryForm</Edit>
-  <New>DocumentLibraryForm</New>
-</FormTemplates>
+<p:properties xmlns:p="http://schemas.microsoft.com/office/2006/metadata/properties" xmlns:xsi="http://www.w3.org/2001/XMLSchema-instance" xmlns:pc="http://schemas.microsoft.com/office/infopath/2007/PartnerControls">
+  <documentManagement>
+    <_ip_UnifiedCompliancePolicyUIAction xmlns="http://schemas.microsoft.com/sharepoint/v3" xsi:nil="true"/>
+    <Image xmlns="71af3243-3dd4-4a8d-8c0d-dd76da1f02a5">
+      <Url xsi:nil="true"/>
+      <Description xsi:nil="true"/>
+    </Image>
+    <Status xmlns="71af3243-3dd4-4a8d-8c0d-dd76da1f02a5">Not started</Status>
+    <_ip_UnifiedCompliancePolicyProperties xmlns="http://schemas.microsoft.com/sharepoint/v3" xsi:nil="true"/>
+    <lcf76f155ced4ddcb4097134ff3c332f xmlns="71af3243-3dd4-4a8d-8c0d-dd76da1f02a5">
+      <Terms xmlns="http://schemas.microsoft.com/office/infopath/2007/PartnerControls"/>
+    </lcf76f155ced4ddcb4097134ff3c332f>
+    <TaxCatchAll xmlns="230e9df3-be65-4c73-a93b-d1236ebd677e"/>
+    <MediaServiceKeyPoints xmlns="71af3243-3dd4-4a8d-8c0d-dd76da1f02a5" xsi:nil="true"/>
+  </documentManagement>
+</p:properties>
 </file>
 
 <file path=customXml/itemProps1.xml><?xml version="1.0" encoding="utf-8"?>
-<ds:datastoreItem xmlns:ds="http://schemas.openxmlformats.org/officeDocument/2006/customXml" ds:itemID="{46275531-F059-4661-BC99-5916D6312804}">
+<ds:datastoreItem xmlns:ds="http://schemas.openxmlformats.org/officeDocument/2006/customXml" ds:itemID="{81E232BF-B213-4F24-BBD3-1528B29F127A}">
   <ds:schemaRefs>
-    <ds:schemaRef ds:uri="http://schemas.microsoft.com/office/2006/metadata/properties"/>
-    <ds:schemaRef ds:uri="http://schemas.microsoft.com/office/infopath/2007/PartnerControls"/>
-    <ds:schemaRef ds:uri="http://schemas.microsoft.com/sharepoint/v3"/>
-    <ds:schemaRef ds:uri="71af3243-3dd4-4a8d-8c0d-dd76da1f02a5"/>
-    <ds:schemaRef ds:uri="230e9df3-be65-4c73-a93b-d1236ebd677e"/>
+    <ds:schemaRef ds:uri="http://schemas.microsoft.com/sharepoint/v3/contenttype/forms"/>
   </ds:schemaRefs>
 </ds:datastoreItem>
 </file>
@@ -27403,9 +27424,13 @@
 </file>
 
 <file path=customXml/itemProps3.xml><?xml version="1.0" encoding="utf-8"?>
-<ds:datastoreItem xmlns:ds="http://schemas.openxmlformats.org/officeDocument/2006/customXml" ds:itemID="{81E232BF-B213-4F24-BBD3-1528B29F127A}">
+<ds:datastoreItem xmlns:ds="http://schemas.openxmlformats.org/officeDocument/2006/customXml" ds:itemID="{46275531-F059-4661-BC99-5916D6312804}">
   <ds:schemaRefs>
-    <ds:schemaRef ds:uri="http://schemas.microsoft.com/sharepoint/v3/contenttype/forms"/>
+    <ds:schemaRef ds:uri="http://schemas.microsoft.com/office/2006/metadata/properties"/>
+    <ds:schemaRef ds:uri="http://schemas.microsoft.com/office/infopath/2007/PartnerControls"/>
+    <ds:schemaRef ds:uri="http://schemas.microsoft.com/sharepoint/v3"/>
+    <ds:schemaRef ds:uri="71af3243-3dd4-4a8d-8c0d-dd76da1f02a5"/>
+    <ds:schemaRef ds:uri="230e9df3-be65-4c73-a93b-d1236ebd677e"/>
   </ds:schemaRefs>
 </ds:datastoreItem>
 </file>

</xml_diff>